<commit_message>
Started HW8 in Jupyter Notebook and PPT
</commit_message>
<xml_diff>
--- a/DSSS_HW_JImhoff.pptx
+++ b/DSSS_HW_JImhoff.pptx
@@ -9,6 +9,7 @@
     <p:sldId id="258" r:id="rId3"/>
     <p:sldId id="257" r:id="rId4"/>
     <p:sldId id="259" r:id="rId5"/>
+    <p:sldId id="260" r:id="rId6"/>
   </p:sldIdLst>
   <p:sldSz cx="9906000" cy="6858000" type="A4"/>
   <p:notesSz cx="7104063" cy="10234613"/>
@@ -257,7 +258,7 @@
           <a:p>
             <a:fld id="{1DC94265-D558-479C-B273-1E0799ACBC99}" type="datetimeFigureOut">
               <a:rPr lang="en-GB" smtClean="0"/>
-              <a:t>14/12/2024</a:t>
+              <a:t>06/01/2025</a:t>
             </a:fld>
             <a:endParaRPr lang="en-GB"/>
           </a:p>
@@ -427,7 +428,7 @@
           <a:p>
             <a:fld id="{1DC94265-D558-479C-B273-1E0799ACBC99}" type="datetimeFigureOut">
               <a:rPr lang="en-GB" smtClean="0"/>
-              <a:t>14/12/2024</a:t>
+              <a:t>06/01/2025</a:t>
             </a:fld>
             <a:endParaRPr lang="en-GB"/>
           </a:p>
@@ -607,7 +608,7 @@
           <a:p>
             <a:fld id="{1DC94265-D558-479C-B273-1E0799ACBC99}" type="datetimeFigureOut">
               <a:rPr lang="en-GB" smtClean="0"/>
-              <a:t>14/12/2024</a:t>
+              <a:t>06/01/2025</a:t>
             </a:fld>
             <a:endParaRPr lang="en-GB"/>
           </a:p>
@@ -777,7 +778,7 @@
           <a:p>
             <a:fld id="{1DC94265-D558-479C-B273-1E0799ACBC99}" type="datetimeFigureOut">
               <a:rPr lang="en-GB" smtClean="0"/>
-              <a:t>14/12/2024</a:t>
+              <a:t>06/01/2025</a:t>
             </a:fld>
             <a:endParaRPr lang="en-GB"/>
           </a:p>
@@ -1023,7 +1024,7 @@
           <a:p>
             <a:fld id="{1DC94265-D558-479C-B273-1E0799ACBC99}" type="datetimeFigureOut">
               <a:rPr lang="en-GB" smtClean="0"/>
-              <a:t>14/12/2024</a:t>
+              <a:t>06/01/2025</a:t>
             </a:fld>
             <a:endParaRPr lang="en-GB"/>
           </a:p>
@@ -1255,7 +1256,7 @@
           <a:p>
             <a:fld id="{1DC94265-D558-479C-B273-1E0799ACBC99}" type="datetimeFigureOut">
               <a:rPr lang="en-GB" smtClean="0"/>
-              <a:t>14/12/2024</a:t>
+              <a:t>06/01/2025</a:t>
             </a:fld>
             <a:endParaRPr lang="en-GB"/>
           </a:p>
@@ -1622,7 +1623,7 @@
           <a:p>
             <a:fld id="{1DC94265-D558-479C-B273-1E0799ACBC99}" type="datetimeFigureOut">
               <a:rPr lang="en-GB" smtClean="0"/>
-              <a:t>14/12/2024</a:t>
+              <a:t>06/01/2025</a:t>
             </a:fld>
             <a:endParaRPr lang="en-GB"/>
           </a:p>
@@ -1740,7 +1741,7 @@
           <a:p>
             <a:fld id="{1DC94265-D558-479C-B273-1E0799ACBC99}" type="datetimeFigureOut">
               <a:rPr lang="en-GB" smtClean="0"/>
-              <a:t>14/12/2024</a:t>
+              <a:t>06/01/2025</a:t>
             </a:fld>
             <a:endParaRPr lang="en-GB"/>
           </a:p>
@@ -1835,7 +1836,7 @@
           <a:p>
             <a:fld id="{1DC94265-D558-479C-B273-1E0799ACBC99}" type="datetimeFigureOut">
               <a:rPr lang="en-GB" smtClean="0"/>
-              <a:t>14/12/2024</a:t>
+              <a:t>06/01/2025</a:t>
             </a:fld>
             <a:endParaRPr lang="en-GB"/>
           </a:p>
@@ -2112,7 +2113,7 @@
           <a:p>
             <a:fld id="{1DC94265-D558-479C-B273-1E0799ACBC99}" type="datetimeFigureOut">
               <a:rPr lang="en-GB" smtClean="0"/>
-              <a:t>14/12/2024</a:t>
+              <a:t>06/01/2025</a:t>
             </a:fld>
             <a:endParaRPr lang="en-GB"/>
           </a:p>
@@ -2369,7 +2370,7 @@
           <a:p>
             <a:fld id="{1DC94265-D558-479C-B273-1E0799ACBC99}" type="datetimeFigureOut">
               <a:rPr lang="en-GB" smtClean="0"/>
-              <a:t>14/12/2024</a:t>
+              <a:t>06/01/2025</a:t>
             </a:fld>
             <a:endParaRPr lang="en-GB"/>
           </a:p>
@@ -2582,7 +2583,7 @@
           <a:p>
             <a:fld id="{1DC94265-D558-479C-B273-1E0799ACBC99}" type="datetimeFigureOut">
               <a:rPr lang="en-GB" smtClean="0"/>
-              <a:t>14/12/2024</a:t>
+              <a:t>06/01/2025</a:t>
             </a:fld>
             <a:endParaRPr lang="en-GB"/>
           </a:p>
@@ -4190,8 +4191,8 @@
           </a:prstGeom>
         </p:spPr>
       </p:pic>
-      <mc:AlternateContent xmlns:mc="http://schemas.openxmlformats.org/markup-compatibility/2006">
-        <mc:Choice xmlns:a14="http://schemas.microsoft.com/office/drawing/2010/main" Requires="a14">
+      <mc:AlternateContent xmlns:mc="http://schemas.openxmlformats.org/markup-compatibility/2006" xmlns:a14="http://schemas.microsoft.com/office/drawing/2010/main">
+        <mc:Choice Requires="a14">
           <p:sp>
             <p:nvSpPr>
               <p:cNvPr id="40" name="Textfeld 39">
@@ -4409,7 +4410,7 @@
             </p:txBody>
           </p:sp>
         </mc:Choice>
-        <mc:Fallback>
+        <mc:Fallback xmlns="">
           <p:sp>
             <p:nvSpPr>
               <p:cNvPr id="40" name="Textfeld 39">
@@ -4454,8 +4455,8 @@
           </p:sp>
         </mc:Fallback>
       </mc:AlternateContent>
-      <mc:AlternateContent xmlns:mc="http://schemas.openxmlformats.org/markup-compatibility/2006">
-        <mc:Choice xmlns:a14="http://schemas.microsoft.com/office/drawing/2010/main" Requires="a14">
+      <mc:AlternateContent xmlns:mc="http://schemas.openxmlformats.org/markup-compatibility/2006" xmlns:a14="http://schemas.microsoft.com/office/drawing/2010/main">
+        <mc:Choice Requires="a14">
           <p:sp>
             <p:nvSpPr>
               <p:cNvPr id="41" name="Textfeld 40">
@@ -4643,7 +4644,7 @@
             </p:txBody>
           </p:sp>
         </mc:Choice>
-        <mc:Fallback>
+        <mc:Fallback xmlns="">
           <p:sp>
             <p:nvSpPr>
               <p:cNvPr id="41" name="Textfeld 40">
@@ -4912,6 +4913,274 @@
     <p:extLst>
       <p:ext uri="{BB962C8B-B14F-4D97-AF65-F5344CB8AC3E}">
         <p14:creationId xmlns:p14="http://schemas.microsoft.com/office/powerpoint/2010/main" val="3510827638"/>
+      </p:ext>
+    </p:extLst>
+  </p:cSld>
+  <p:clrMapOvr>
+    <a:masterClrMapping/>
+  </p:clrMapOvr>
+</p:sld>
+</file>
+
+<file path=ppt/slides/slide5.xml><?xml version="1.0" encoding="utf-8"?>
+<p:sld xmlns:a="http://schemas.openxmlformats.org/drawingml/2006/main" xmlns:r="http://schemas.openxmlformats.org/officeDocument/2006/relationships" xmlns:p="http://schemas.openxmlformats.org/presentationml/2006/main">
+  <p:cSld>
+    <p:spTree>
+      <p:nvGrpSpPr>
+        <p:cNvPr id="1" name="">
+          <a:extLst>
+            <a:ext uri="{FF2B5EF4-FFF2-40B4-BE49-F238E27FC236}">
+              <a16:creationId xmlns:a16="http://schemas.microsoft.com/office/drawing/2014/main" id="{B7BC3640-C27E-E0D1-A59B-249BC7E635AA}"/>
+            </a:ext>
+          </a:extLst>
+        </p:cNvPr>
+        <p:cNvGrpSpPr/>
+        <p:nvPr/>
+      </p:nvGrpSpPr>
+      <p:grpSpPr>
+        <a:xfrm>
+          <a:off x="0" y="0"/>
+          <a:ext cx="0" cy="0"/>
+          <a:chOff x="0" y="0"/>
+          <a:chExt cx="0" cy="0"/>
+        </a:xfrm>
+      </p:grpSpPr>
+      <p:sp>
+        <p:nvSpPr>
+          <p:cNvPr id="4" name="Textfeld 3">
+            <a:extLst>
+              <a:ext uri="{FF2B5EF4-FFF2-40B4-BE49-F238E27FC236}">
+                <a16:creationId xmlns:a16="http://schemas.microsoft.com/office/drawing/2014/main" id="{1753DF21-6648-0AFD-1A15-17785833323B}"/>
+              </a:ext>
+            </a:extLst>
+          </p:cNvPr>
+          <p:cNvSpPr txBox="1"/>
+          <p:nvPr/>
+        </p:nvSpPr>
+        <p:spPr>
+          <a:xfrm>
+            <a:off x="358665" y="6258457"/>
+            <a:ext cx="4937539" cy="276999"/>
+          </a:xfrm>
+          <a:prstGeom prst="rect">
+            <a:avLst/>
+          </a:prstGeom>
+          <a:noFill/>
+        </p:spPr>
+        <p:txBody>
+          <a:bodyPr wrap="square" lIns="29250" rtlCol="0">
+            <a:spAutoFit/>
+          </a:bodyPr>
+          <a:lstStyle/>
+          <a:p>
+            <a:r>
+              <a:rPr lang="en-GB" sz="1200" b="1" dirty="0"/>
+              <a:t>Name</a:t>
+            </a:r>
+            <a:r>
+              <a:rPr lang="en-GB" sz="1200" dirty="0"/>
+              <a:t>: Josephina Imhoff | </a:t>
+            </a:r>
+            <a:r>
+              <a:rPr lang="en-GB" sz="1200" b="1" dirty="0"/>
+              <a:t>Matriculation No.: </a:t>
+            </a:r>
+            <a:r>
+              <a:rPr lang="en-GB" sz="1200" dirty="0"/>
+              <a:t>23464631 | </a:t>
+            </a:r>
+            <a:r>
+              <a:rPr lang="en-GB" sz="1200" b="1" dirty="0" err="1"/>
+              <a:t>IdM</a:t>
+            </a:r>
+            <a:r>
+              <a:rPr lang="en-GB" sz="1200" b="1" dirty="0"/>
+              <a:t>:</a:t>
+            </a:r>
+            <a:r>
+              <a:rPr lang="en-GB" sz="1200" dirty="0"/>
+              <a:t> jo17wila</a:t>
+            </a:r>
+          </a:p>
+        </p:txBody>
+      </p:sp>
+      <p:sp>
+        <p:nvSpPr>
+          <p:cNvPr id="5" name="Textfeld 4">
+            <a:extLst>
+              <a:ext uri="{FF2B5EF4-FFF2-40B4-BE49-F238E27FC236}">
+                <a16:creationId xmlns:a16="http://schemas.microsoft.com/office/drawing/2014/main" id="{12B943A2-B336-1826-456E-F03145B92609}"/>
+              </a:ext>
+            </a:extLst>
+          </p:cNvPr>
+          <p:cNvSpPr txBox="1"/>
+          <p:nvPr/>
+        </p:nvSpPr>
+        <p:spPr>
+          <a:xfrm>
+            <a:off x="358666" y="322544"/>
+            <a:ext cx="4722428" cy="461665"/>
+          </a:xfrm>
+          <a:prstGeom prst="rect">
+            <a:avLst/>
+          </a:prstGeom>
+          <a:noFill/>
+        </p:spPr>
+        <p:txBody>
+          <a:bodyPr wrap="square" lIns="29250" rtlCol="0">
+            <a:spAutoFit/>
+          </a:bodyPr>
+          <a:lstStyle/>
+          <a:p>
+            <a:r>
+              <a:rPr lang="en-GB" sz="2400" b="1" dirty="0"/>
+              <a:t>Homework 8</a:t>
+            </a:r>
+          </a:p>
+        </p:txBody>
+      </p:sp>
+      <p:pic>
+        <p:nvPicPr>
+          <p:cNvPr id="3" name="Grafik 2" descr="Ein Bild, das Diagramm enthält.&#10;&#10;Automatisch generierte Beschreibung">
+            <a:extLst>
+              <a:ext uri="{FF2B5EF4-FFF2-40B4-BE49-F238E27FC236}">
+                <a16:creationId xmlns:a16="http://schemas.microsoft.com/office/drawing/2014/main" id="{C5D343C7-161C-03A7-CBA0-215348CAE662}"/>
+              </a:ext>
+            </a:extLst>
+          </p:cNvPr>
+          <p:cNvPicPr>
+            <a:picLocks noChangeAspect="1"/>
+          </p:cNvPicPr>
+          <p:nvPr/>
+        </p:nvPicPr>
+        <p:blipFill>
+          <a:blip r:embed="rId2">
+            <a:extLst>
+              <a:ext uri="{28A0092B-C50C-407E-A947-70E740481C1C}">
+                <a14:useLocalDpi xmlns:a14="http://schemas.microsoft.com/office/drawing/2010/main" val="0"/>
+              </a:ext>
+            </a:extLst>
+          </a:blip>
+          <a:srcRect l="17448" t="5476" r="17532" b="4469"/>
+          <a:stretch/>
+        </p:blipFill>
+        <p:spPr>
+          <a:xfrm>
+            <a:off x="358665" y="3748957"/>
+            <a:ext cx="2013367" cy="2091404"/>
+          </a:xfrm>
+          <a:prstGeom prst="rect">
+            <a:avLst/>
+          </a:prstGeom>
+        </p:spPr>
+      </p:pic>
+      <p:sp>
+        <p:nvSpPr>
+          <p:cNvPr id="6" name="Textfeld 5">
+            <a:extLst>
+              <a:ext uri="{FF2B5EF4-FFF2-40B4-BE49-F238E27FC236}">
+                <a16:creationId xmlns:a16="http://schemas.microsoft.com/office/drawing/2014/main" id="{20C90885-5A6C-8504-D61C-29B7084E47A8}"/>
+              </a:ext>
+            </a:extLst>
+          </p:cNvPr>
+          <p:cNvSpPr txBox="1"/>
+          <p:nvPr/>
+        </p:nvSpPr>
+        <p:spPr>
+          <a:xfrm>
+            <a:off x="3028335" y="322544"/>
+            <a:ext cx="6518999" cy="2308324"/>
+          </a:xfrm>
+          <a:prstGeom prst="rect">
+            <a:avLst/>
+          </a:prstGeom>
+          <a:noFill/>
+        </p:spPr>
+        <p:txBody>
+          <a:bodyPr wrap="square" rtlCol="0">
+            <a:spAutoFit/>
+          </a:bodyPr>
+          <a:lstStyle/>
+          <a:p>
+            <a:r>
+              <a:rPr lang="en-GB" dirty="0"/>
+              <a:t>Answers to Questions:</a:t>
+            </a:r>
+          </a:p>
+          <a:p>
+            <a:endParaRPr lang="en-GB" dirty="0"/>
+          </a:p>
+          <a:p>
+            <a:pPr marL="285750" indent="-285750">
+              <a:buFont typeface="Arial" panose="020B0604020202020204" pitchFamily="34" charset="0"/>
+              <a:buChar char="•"/>
+            </a:pPr>
+            <a:r>
+              <a:rPr lang="en-GB" dirty="0"/>
+              <a:t>Five Activation Functions: </a:t>
+            </a:r>
+          </a:p>
+          <a:p>
+            <a:pPr marL="800100" lvl="1" indent="-342900">
+              <a:buFont typeface="+mj-lt"/>
+              <a:buAutoNum type="arabicPeriod"/>
+            </a:pPr>
+            <a:r>
+              <a:rPr lang="en-GB" dirty="0"/>
+              <a:t>(Leaky) </a:t>
+            </a:r>
+            <a:r>
+              <a:rPr lang="en-GB" dirty="0" err="1"/>
+              <a:t>ReLU</a:t>
+            </a:r>
+            <a:endParaRPr lang="en-GB" dirty="0"/>
+          </a:p>
+          <a:p>
+            <a:pPr marL="800100" lvl="1" indent="-342900">
+              <a:buFont typeface="+mj-lt"/>
+              <a:buAutoNum type="arabicPeriod"/>
+            </a:pPr>
+            <a:r>
+              <a:rPr lang="en-GB" dirty="0"/>
+              <a:t>Sigmoid function (or hyperbolic tangent)</a:t>
+            </a:r>
+          </a:p>
+          <a:p>
+            <a:pPr marL="800100" lvl="1" indent="-342900">
+              <a:buFont typeface="+mj-lt"/>
+              <a:buAutoNum type="arabicPeriod"/>
+            </a:pPr>
+            <a:r>
+              <a:rPr lang="en-GB" dirty="0"/>
+              <a:t>Linear function</a:t>
+            </a:r>
+          </a:p>
+          <a:p>
+            <a:pPr marL="800100" lvl="1" indent="-342900">
+              <a:buFont typeface="+mj-lt"/>
+              <a:buAutoNum type="arabicPeriod"/>
+            </a:pPr>
+            <a:r>
+              <a:rPr lang="en-GB" dirty="0"/>
+              <a:t>Step function (signum or unit step)</a:t>
+            </a:r>
+          </a:p>
+          <a:p>
+            <a:pPr marL="800100" lvl="1" indent="-342900">
+              <a:buFont typeface="+mj-lt"/>
+              <a:buAutoNum type="arabicPeriod"/>
+            </a:pPr>
+            <a:r>
+              <a:rPr lang="en-GB" dirty="0"/>
+              <a:t>Piecewise linear</a:t>
+            </a:r>
+          </a:p>
+        </p:txBody>
+      </p:sp>
+    </p:spTree>
+    <p:extLst>
+      <p:ext uri="{BB962C8B-B14F-4D97-AF65-F5344CB8AC3E}">
+        <p14:creationId xmlns:p14="http://schemas.microsoft.com/office/powerpoint/2010/main" val="3277636542"/>
       </p:ext>
     </p:extLst>
   </p:cSld>

</xml_diff>

<commit_message>
started making answer slide for HW8
</commit_message>
<xml_diff>
--- a/DSSS_HW_JImhoff.pptx
+++ b/DSSS_HW_JImhoff.pptx
@@ -5088,8 +5088,8 @@
         </p:nvSpPr>
         <p:spPr>
           <a:xfrm>
-            <a:off x="3028335" y="322544"/>
-            <a:ext cx="6518999" cy="2308324"/>
+            <a:off x="5860026" y="322544"/>
+            <a:ext cx="3687308" cy="3862596"/>
           </a:xfrm>
           <a:prstGeom prst="rect">
             <a:avLst/>
@@ -5102,77 +5102,171 @@
           </a:bodyPr>
           <a:lstStyle/>
           <a:p>
-            <a:r>
-              <a:rPr lang="en-GB" dirty="0"/>
+            <a:pPr marL="180975" indent="-180975"/>
+            <a:r>
+              <a:rPr lang="en-GB" sz="1400" dirty="0"/>
               <a:t>Answers to Questions:</a:t>
             </a:r>
           </a:p>
           <a:p>
-            <a:endParaRPr lang="en-GB" dirty="0"/>
-          </a:p>
-          <a:p>
-            <a:pPr marL="285750" indent="-285750">
+            <a:pPr marL="180975" indent="-180975"/>
+            <a:endParaRPr lang="en-GB" sz="1100" dirty="0"/>
+          </a:p>
+          <a:p>
+            <a:pPr marL="180975" indent="-180975"/>
+            <a:r>
+              <a:rPr lang="en-GB" sz="1100" dirty="0"/>
+              <a:t>Five Activation Functions: </a:t>
+            </a:r>
+          </a:p>
+          <a:p>
+            <a:pPr marL="357188" indent="-180975" defTabSz="446088">
+              <a:buFont typeface="+mj-lt"/>
+              <a:buAutoNum type="arabicPeriod"/>
+            </a:pPr>
+            <a:r>
+              <a:rPr lang="en-GB" sz="1100" dirty="0"/>
+              <a:t>(Leaky) </a:t>
+            </a:r>
+            <a:r>
+              <a:rPr lang="en-GB" sz="1100" dirty="0" err="1"/>
+              <a:t>ReLU</a:t>
+            </a:r>
+            <a:endParaRPr lang="en-GB" sz="1100" dirty="0"/>
+          </a:p>
+          <a:p>
+            <a:pPr marL="357188" indent="-180975" defTabSz="446088">
+              <a:buFont typeface="+mj-lt"/>
+              <a:buAutoNum type="arabicPeriod"/>
+            </a:pPr>
+            <a:r>
+              <a:rPr lang="en-GB" sz="1100" dirty="0"/>
+              <a:t>Sigmoid function (or hyperbolic tangent)</a:t>
+            </a:r>
+          </a:p>
+          <a:p>
+            <a:pPr marL="357188" indent="-180975" defTabSz="446088">
+              <a:buFont typeface="+mj-lt"/>
+              <a:buAutoNum type="arabicPeriod"/>
+            </a:pPr>
+            <a:r>
+              <a:rPr lang="en-GB" sz="1100" dirty="0"/>
+              <a:t>Linear function</a:t>
+            </a:r>
+          </a:p>
+          <a:p>
+            <a:pPr marL="357188" indent="-180975" defTabSz="446088">
+              <a:buFont typeface="+mj-lt"/>
+              <a:buAutoNum type="arabicPeriod"/>
+            </a:pPr>
+            <a:r>
+              <a:rPr lang="en-GB" sz="1100" dirty="0"/>
+              <a:t>Step function (signum or unit step)</a:t>
+            </a:r>
+          </a:p>
+          <a:p>
+            <a:pPr marL="357188" indent="-180975" defTabSz="446088">
+              <a:buFont typeface="+mj-lt"/>
+              <a:buAutoNum type="arabicPeriod"/>
+            </a:pPr>
+            <a:r>
+              <a:rPr lang="en-GB" sz="1100" dirty="0"/>
+              <a:t>Piecewise linear</a:t>
+            </a:r>
+          </a:p>
+          <a:p>
+            <a:pPr marL="180975" indent="-180975"/>
+            <a:r>
+              <a:rPr lang="en-GB" sz="1100" dirty="0"/>
+              <a:t>Adam: </a:t>
+            </a:r>
+            <a:br>
+              <a:rPr lang="en-GB" sz="1100" dirty="0"/>
+            </a:br>
+            <a:r>
+              <a:rPr lang="en-GB" sz="1100" i="1" dirty="0"/>
+              <a:t>Adam</a:t>
+            </a:r>
+            <a:r>
+              <a:rPr lang="en-GB" sz="1100" dirty="0"/>
+              <a:t> is an optimizer based on stochastic gradient descent using adaptive moment estimation, helping the algorithm converge a local minimum faster.</a:t>
+            </a:r>
+          </a:p>
+          <a:p>
+            <a:pPr marL="180975" indent="-180975"/>
+            <a:r>
+              <a:rPr lang="en-GB" sz="1100" dirty="0" err="1"/>
+              <a:t>sparse_categorical_crossentropy</a:t>
+            </a:r>
+            <a:r>
+              <a:rPr lang="en-GB" sz="1100" dirty="0"/>
+              <a:t>:</a:t>
+            </a:r>
+          </a:p>
+          <a:p>
+            <a:pPr marL="357188" indent="-180975">
               <a:buFont typeface="Arial" panose="020B0604020202020204" pitchFamily="34" charset="0"/>
               <a:buChar char="•"/>
             </a:pPr>
             <a:r>
-              <a:rPr lang="en-GB" dirty="0"/>
-              <a:t>Five Activation Functions: </a:t>
-            </a:r>
-          </a:p>
-          <a:p>
-            <a:pPr marL="800100" lvl="1" indent="-342900">
-              <a:buFont typeface="+mj-lt"/>
-              <a:buAutoNum type="arabicPeriod"/>
+              <a:rPr lang="en-GB" sz="1100" dirty="0"/>
+              <a:t>Loss-function for </a:t>
+            </a:r>
+            <a:r>
+              <a:rPr lang="en-US" sz="1100" dirty="0"/>
+              <a:t>classification tasks with mutually exclusive classes</a:t>
+            </a:r>
+          </a:p>
+          <a:p>
+            <a:pPr marL="357188" indent="-180975">
+              <a:buFont typeface="Arial" panose="020B0604020202020204" pitchFamily="34" charset="0"/>
+              <a:buChar char="•"/>
             </a:pPr>
             <a:r>
-              <a:rPr lang="en-GB" dirty="0"/>
-              <a:t>(Leaky) </a:t>
-            </a:r>
-            <a:r>
-              <a:rPr lang="en-GB" dirty="0" err="1"/>
-              <a:t>ReLU</a:t>
-            </a:r>
-            <a:endParaRPr lang="en-GB" dirty="0"/>
-          </a:p>
-          <a:p>
-            <a:pPr marL="800100" lvl="1" indent="-342900">
-              <a:buFont typeface="+mj-lt"/>
-              <a:buAutoNum type="arabicPeriod"/>
+              <a:rPr lang="en-US" sz="1100" dirty="0"/>
+              <a:t>expects integer labels (not one-hot encoded)</a:t>
+            </a:r>
+          </a:p>
+          <a:p>
+            <a:pPr marL="357188" indent="-180975">
+              <a:buFont typeface="Arial" panose="020B0604020202020204" pitchFamily="34" charset="0"/>
+              <a:buChar char="•"/>
             </a:pPr>
             <a:r>
-              <a:rPr lang="en-GB" dirty="0"/>
-              <a:t>Sigmoid function (or hyperbolic tangent)</a:t>
-            </a:r>
-          </a:p>
-          <a:p>
-            <a:pPr marL="800100" lvl="1" indent="-342900">
-              <a:buFont typeface="+mj-lt"/>
-              <a:buAutoNum type="arabicPeriod"/>
+              <a:rPr lang="en-US" sz="1100" dirty="0"/>
+              <a:t>computes the cross-entropy loss</a:t>
+            </a:r>
+          </a:p>
+          <a:p>
+            <a:pPr marL="357188" indent="-180975">
+              <a:buFont typeface="Arial" panose="020B0604020202020204" pitchFamily="34" charset="0"/>
+              <a:buChar char="•"/>
             </a:pPr>
             <a:r>
-              <a:rPr lang="en-GB" dirty="0"/>
-              <a:t>Linear function</a:t>
-            </a:r>
-          </a:p>
-          <a:p>
-            <a:pPr marL="800100" lvl="1" indent="-342900">
-              <a:buFont typeface="+mj-lt"/>
-              <a:buAutoNum type="arabicPeriod"/>
-            </a:pPr>
-            <a:r>
-              <a:rPr lang="en-GB" dirty="0"/>
-              <a:t>Step function (signum or unit step)</a:t>
-            </a:r>
-          </a:p>
-          <a:p>
-            <a:pPr marL="800100" lvl="1" indent="-342900">
-              <a:buFont typeface="+mj-lt"/>
-              <a:buAutoNum type="arabicPeriod"/>
-            </a:pPr>
-            <a:r>
-              <a:rPr lang="en-GB" dirty="0"/>
-              <a:t>Piecewise linear</a:t>
+              <a:rPr lang="en-US" sz="1100" dirty="0"/>
+              <a:t>particularly useful for multi-class problems where the target is a single class index</a:t>
+            </a:r>
+          </a:p>
+          <a:p>
+            <a:pPr marL="176213" indent="-176213"/>
+            <a:r>
+              <a:rPr lang="en-US" sz="1100" dirty="0"/>
+              <a:t>Epoch:</a:t>
+            </a:r>
+            <a:br>
+              <a:rPr lang="en-US" sz="1100" dirty="0"/>
+            </a:br>
+            <a:r>
+              <a:rPr lang="en-US" sz="1100" dirty="0"/>
+              <a:t>An </a:t>
+            </a:r>
+            <a:r>
+              <a:rPr lang="en-US" sz="1100" i="1" dirty="0"/>
+              <a:t>epoch</a:t>
+            </a:r>
+            <a:r>
+              <a:rPr lang="en-US" sz="1100" dirty="0"/>
+              <a:t> is one complete pass through the whole training set during the training of a ML model.</a:t>
             </a:r>
           </a:p>
         </p:txBody>

</xml_diff>

<commit_message>
started new HW9 + some new files
</commit_message>
<xml_diff>
--- a/DSSS_HW_JImhoff.pptx
+++ b/DSSS_HW_JImhoff.pptx
@@ -4,6 +4,9 @@
   <p:sldMasterIdLst>
     <p:sldMasterId id="2147483660" r:id="rId1"/>
   </p:sldMasterIdLst>
+  <p:notesMasterIdLst>
+    <p:notesMasterId r:id="rId7"/>
+  </p:notesMasterIdLst>
   <p:sldIdLst>
     <p:sldId id="256" r:id="rId2"/>
     <p:sldId id="258" r:id="rId3"/>
@@ -12,7 +15,7 @@
     <p:sldId id="260" r:id="rId6"/>
   </p:sldIdLst>
   <p:sldSz cx="9906000" cy="6858000" type="A4"/>
-  <p:notesSz cx="7104063" cy="10234613"/>
+  <p:notesSz cx="7315200" cy="9601200"/>
   <p:defaultTextStyle>
     <a:defPPr>
       <a:defRPr lang="en-US"/>
@@ -127,6 +130,356 @@
 </p:presentation>
 </file>
 
+<file path=ppt/notesMasters/notesMaster1.xml><?xml version="1.0" encoding="utf-8"?>
+<p:notesMaster xmlns:a="http://schemas.openxmlformats.org/drawingml/2006/main" xmlns:r="http://schemas.openxmlformats.org/officeDocument/2006/relationships" xmlns:p="http://schemas.openxmlformats.org/presentationml/2006/main">
+  <p:cSld>
+    <p:bg>
+      <p:bgRef idx="1001">
+        <a:schemeClr val="bg1"/>
+      </p:bgRef>
+    </p:bg>
+    <p:spTree>
+      <p:nvGrpSpPr>
+        <p:cNvPr id="1" name=""/>
+        <p:cNvGrpSpPr/>
+        <p:nvPr/>
+      </p:nvGrpSpPr>
+      <p:grpSpPr>
+        <a:xfrm>
+          <a:off x="0" y="0"/>
+          <a:ext cx="0" cy="0"/>
+          <a:chOff x="0" y="0"/>
+          <a:chExt cx="0" cy="0"/>
+        </a:xfrm>
+      </p:grpSpPr>
+      <p:sp>
+        <p:nvSpPr>
+          <p:cNvPr id="2" name="Kopfzeilenplatzhalter 1"/>
+          <p:cNvSpPr>
+            <a:spLocks noGrp="1"/>
+          </p:cNvSpPr>
+          <p:nvPr>
+            <p:ph type="hdr" sz="quarter"/>
+          </p:nvPr>
+        </p:nvSpPr>
+        <p:spPr>
+          <a:xfrm>
+            <a:off x="0" y="0"/>
+            <a:ext cx="3170238" cy="481013"/>
+          </a:xfrm>
+          <a:prstGeom prst="rect">
+            <a:avLst/>
+          </a:prstGeom>
+        </p:spPr>
+        <p:txBody>
+          <a:bodyPr vert="horz" lIns="91440" tIns="45720" rIns="91440" bIns="45720" rtlCol="0"/>
+          <a:lstStyle>
+            <a:lvl1pPr algn="l">
+              <a:defRPr sz="1200"/>
+            </a:lvl1pPr>
+          </a:lstStyle>
+          <a:p>
+            <a:endParaRPr lang="en-GB"/>
+          </a:p>
+        </p:txBody>
+      </p:sp>
+      <p:sp>
+        <p:nvSpPr>
+          <p:cNvPr id="3" name="Datumsplatzhalter 2"/>
+          <p:cNvSpPr>
+            <a:spLocks noGrp="1"/>
+          </p:cNvSpPr>
+          <p:nvPr>
+            <p:ph type="dt" idx="1"/>
+          </p:nvPr>
+        </p:nvSpPr>
+        <p:spPr>
+          <a:xfrm>
+            <a:off x="4143375" y="0"/>
+            <a:ext cx="3170238" cy="481013"/>
+          </a:xfrm>
+          <a:prstGeom prst="rect">
+            <a:avLst/>
+          </a:prstGeom>
+        </p:spPr>
+        <p:txBody>
+          <a:bodyPr vert="horz" lIns="91440" tIns="45720" rIns="91440" bIns="45720" rtlCol="0"/>
+          <a:lstStyle>
+            <a:lvl1pPr algn="r">
+              <a:defRPr sz="1200"/>
+            </a:lvl1pPr>
+          </a:lstStyle>
+          <a:p>
+            <a:fld id="{3F5040D0-9E54-4261-8C26-994613EA8D38}" type="datetimeFigureOut">
+              <a:rPr lang="en-GB" smtClean="0"/>
+              <a:t>07/01/2025</a:t>
+            </a:fld>
+            <a:endParaRPr lang="en-GB"/>
+          </a:p>
+        </p:txBody>
+      </p:sp>
+      <p:sp>
+        <p:nvSpPr>
+          <p:cNvPr id="4" name="Folienbildplatzhalter 3"/>
+          <p:cNvSpPr>
+            <a:spLocks noGrp="1" noRot="1" noChangeAspect="1"/>
+          </p:cNvSpPr>
+          <p:nvPr>
+            <p:ph type="sldImg" idx="2"/>
+          </p:nvPr>
+        </p:nvSpPr>
+        <p:spPr>
+          <a:xfrm>
+            <a:off x="1317625" y="1200150"/>
+            <a:ext cx="4679950" cy="3240088"/>
+          </a:xfrm>
+          <a:prstGeom prst="rect">
+            <a:avLst/>
+          </a:prstGeom>
+          <a:noFill/>
+          <a:ln w="12700">
+            <a:solidFill>
+              <a:prstClr val="black"/>
+            </a:solidFill>
+          </a:ln>
+        </p:spPr>
+        <p:txBody>
+          <a:bodyPr vert="horz" lIns="91440" tIns="45720" rIns="91440" bIns="45720" rtlCol="0" anchor="ctr"/>
+          <a:lstStyle/>
+          <a:p>
+            <a:endParaRPr lang="en-GB"/>
+          </a:p>
+        </p:txBody>
+      </p:sp>
+      <p:sp>
+        <p:nvSpPr>
+          <p:cNvPr id="5" name="Notizenplatzhalter 4"/>
+          <p:cNvSpPr>
+            <a:spLocks noGrp="1"/>
+          </p:cNvSpPr>
+          <p:nvPr>
+            <p:ph type="body" sz="quarter" idx="3"/>
+          </p:nvPr>
+        </p:nvSpPr>
+        <p:spPr>
+          <a:xfrm>
+            <a:off x="731838" y="4621213"/>
+            <a:ext cx="5851525" cy="3779837"/>
+          </a:xfrm>
+          <a:prstGeom prst="rect">
+            <a:avLst/>
+          </a:prstGeom>
+        </p:spPr>
+        <p:txBody>
+          <a:bodyPr vert="horz" lIns="91440" tIns="45720" rIns="91440" bIns="45720" rtlCol="0"/>
+          <a:lstStyle/>
+          <a:p>
+            <a:pPr lvl="0"/>
+            <a:r>
+              <a:rPr lang="de-DE"/>
+              <a:t>Mastertextformat bearbeiten</a:t>
+            </a:r>
+          </a:p>
+          <a:p>
+            <a:pPr lvl="1"/>
+            <a:r>
+              <a:rPr lang="de-DE"/>
+              <a:t>Zweite Ebene</a:t>
+            </a:r>
+          </a:p>
+          <a:p>
+            <a:pPr lvl="2"/>
+            <a:r>
+              <a:rPr lang="de-DE"/>
+              <a:t>Dritte Ebene</a:t>
+            </a:r>
+          </a:p>
+          <a:p>
+            <a:pPr lvl="3"/>
+            <a:r>
+              <a:rPr lang="de-DE"/>
+              <a:t>Vierte Ebene</a:t>
+            </a:r>
+          </a:p>
+          <a:p>
+            <a:pPr lvl="4"/>
+            <a:r>
+              <a:rPr lang="de-DE"/>
+              <a:t>Fünfte Ebene</a:t>
+            </a:r>
+            <a:endParaRPr lang="en-GB"/>
+          </a:p>
+        </p:txBody>
+      </p:sp>
+      <p:sp>
+        <p:nvSpPr>
+          <p:cNvPr id="6" name="Fußzeilenplatzhalter 5"/>
+          <p:cNvSpPr>
+            <a:spLocks noGrp="1"/>
+          </p:cNvSpPr>
+          <p:nvPr>
+            <p:ph type="ftr" sz="quarter" idx="4"/>
+          </p:nvPr>
+        </p:nvSpPr>
+        <p:spPr>
+          <a:xfrm>
+            <a:off x="0" y="9120188"/>
+            <a:ext cx="3170238" cy="481012"/>
+          </a:xfrm>
+          <a:prstGeom prst="rect">
+            <a:avLst/>
+          </a:prstGeom>
+        </p:spPr>
+        <p:txBody>
+          <a:bodyPr vert="horz" lIns="91440" tIns="45720" rIns="91440" bIns="45720" rtlCol="0" anchor="b"/>
+          <a:lstStyle>
+            <a:lvl1pPr algn="l">
+              <a:defRPr sz="1200"/>
+            </a:lvl1pPr>
+          </a:lstStyle>
+          <a:p>
+            <a:endParaRPr lang="en-GB"/>
+          </a:p>
+        </p:txBody>
+      </p:sp>
+      <p:sp>
+        <p:nvSpPr>
+          <p:cNvPr id="7" name="Foliennummernplatzhalter 6"/>
+          <p:cNvSpPr>
+            <a:spLocks noGrp="1"/>
+          </p:cNvSpPr>
+          <p:nvPr>
+            <p:ph type="sldNum" sz="quarter" idx="5"/>
+          </p:nvPr>
+        </p:nvSpPr>
+        <p:spPr>
+          <a:xfrm>
+            <a:off x="4143375" y="9120188"/>
+            <a:ext cx="3170238" cy="481012"/>
+          </a:xfrm>
+          <a:prstGeom prst="rect">
+            <a:avLst/>
+          </a:prstGeom>
+        </p:spPr>
+        <p:txBody>
+          <a:bodyPr vert="horz" lIns="91440" tIns="45720" rIns="91440" bIns="45720" rtlCol="0" anchor="b"/>
+          <a:lstStyle>
+            <a:lvl1pPr algn="r">
+              <a:defRPr sz="1200"/>
+            </a:lvl1pPr>
+          </a:lstStyle>
+          <a:p>
+            <a:fld id="{CCBA5754-1015-464C-A478-C48DFF1FBF60}" type="slidenum">
+              <a:rPr lang="en-GB" smtClean="0"/>
+              <a:t>‹Nr.›</a:t>
+            </a:fld>
+            <a:endParaRPr lang="en-GB"/>
+          </a:p>
+        </p:txBody>
+      </p:sp>
+    </p:spTree>
+    <p:extLst>
+      <p:ext uri="{BB962C8B-B14F-4D97-AF65-F5344CB8AC3E}">
+        <p14:creationId xmlns:p14="http://schemas.microsoft.com/office/powerpoint/2010/main" val="139762254"/>
+      </p:ext>
+    </p:extLst>
+  </p:cSld>
+  <p:clrMap bg1="lt1" tx1="dk1" bg2="lt2" tx2="dk2" accent1="accent1" accent2="accent2" accent3="accent3" accent4="accent4" accent5="accent5" accent6="accent6" hlink="hlink" folHlink="folHlink"/>
+  <p:notesStyle>
+    <a:lvl1pPr marL="0" algn="l" defTabSz="914400" rtl="0" eaLnBrk="1" latinLnBrk="0" hangingPunct="1">
+      <a:defRPr sz="1200" kern="1200">
+        <a:solidFill>
+          <a:schemeClr val="tx1"/>
+        </a:solidFill>
+        <a:latin typeface="+mn-lt"/>
+        <a:ea typeface="+mn-ea"/>
+        <a:cs typeface="+mn-cs"/>
+      </a:defRPr>
+    </a:lvl1pPr>
+    <a:lvl2pPr marL="457200" algn="l" defTabSz="914400" rtl="0" eaLnBrk="1" latinLnBrk="0" hangingPunct="1">
+      <a:defRPr sz="1200" kern="1200">
+        <a:solidFill>
+          <a:schemeClr val="tx1"/>
+        </a:solidFill>
+        <a:latin typeface="+mn-lt"/>
+        <a:ea typeface="+mn-ea"/>
+        <a:cs typeface="+mn-cs"/>
+      </a:defRPr>
+    </a:lvl2pPr>
+    <a:lvl3pPr marL="914400" algn="l" defTabSz="914400" rtl="0" eaLnBrk="1" latinLnBrk="0" hangingPunct="1">
+      <a:defRPr sz="1200" kern="1200">
+        <a:solidFill>
+          <a:schemeClr val="tx1"/>
+        </a:solidFill>
+        <a:latin typeface="+mn-lt"/>
+        <a:ea typeface="+mn-ea"/>
+        <a:cs typeface="+mn-cs"/>
+      </a:defRPr>
+    </a:lvl3pPr>
+    <a:lvl4pPr marL="1371600" algn="l" defTabSz="914400" rtl="0" eaLnBrk="1" latinLnBrk="0" hangingPunct="1">
+      <a:defRPr sz="1200" kern="1200">
+        <a:solidFill>
+          <a:schemeClr val="tx1"/>
+        </a:solidFill>
+        <a:latin typeface="+mn-lt"/>
+        <a:ea typeface="+mn-ea"/>
+        <a:cs typeface="+mn-cs"/>
+      </a:defRPr>
+    </a:lvl4pPr>
+    <a:lvl5pPr marL="1828800" algn="l" defTabSz="914400" rtl="0" eaLnBrk="1" latinLnBrk="0" hangingPunct="1">
+      <a:defRPr sz="1200" kern="1200">
+        <a:solidFill>
+          <a:schemeClr val="tx1"/>
+        </a:solidFill>
+        <a:latin typeface="+mn-lt"/>
+        <a:ea typeface="+mn-ea"/>
+        <a:cs typeface="+mn-cs"/>
+      </a:defRPr>
+    </a:lvl5pPr>
+    <a:lvl6pPr marL="2286000" algn="l" defTabSz="914400" rtl="0" eaLnBrk="1" latinLnBrk="0" hangingPunct="1">
+      <a:defRPr sz="1200" kern="1200">
+        <a:solidFill>
+          <a:schemeClr val="tx1"/>
+        </a:solidFill>
+        <a:latin typeface="+mn-lt"/>
+        <a:ea typeface="+mn-ea"/>
+        <a:cs typeface="+mn-cs"/>
+      </a:defRPr>
+    </a:lvl6pPr>
+    <a:lvl7pPr marL="2743200" algn="l" defTabSz="914400" rtl="0" eaLnBrk="1" latinLnBrk="0" hangingPunct="1">
+      <a:defRPr sz="1200" kern="1200">
+        <a:solidFill>
+          <a:schemeClr val="tx1"/>
+        </a:solidFill>
+        <a:latin typeface="+mn-lt"/>
+        <a:ea typeface="+mn-ea"/>
+        <a:cs typeface="+mn-cs"/>
+      </a:defRPr>
+    </a:lvl7pPr>
+    <a:lvl8pPr marL="3200400" algn="l" defTabSz="914400" rtl="0" eaLnBrk="1" latinLnBrk="0" hangingPunct="1">
+      <a:defRPr sz="1200" kern="1200">
+        <a:solidFill>
+          <a:schemeClr val="tx1"/>
+        </a:solidFill>
+        <a:latin typeface="+mn-lt"/>
+        <a:ea typeface="+mn-ea"/>
+        <a:cs typeface="+mn-cs"/>
+      </a:defRPr>
+    </a:lvl8pPr>
+    <a:lvl9pPr marL="3657600" algn="l" defTabSz="914400" rtl="0" eaLnBrk="1" latinLnBrk="0" hangingPunct="1">
+      <a:defRPr sz="1200" kern="1200">
+        <a:solidFill>
+          <a:schemeClr val="tx1"/>
+        </a:solidFill>
+        <a:latin typeface="+mn-lt"/>
+        <a:ea typeface="+mn-ea"/>
+        <a:cs typeface="+mn-cs"/>
+      </a:defRPr>
+    </a:lvl9pPr>
+  </p:notesStyle>
+</p:notesMaster>
+</file>
+
 <file path=ppt/slideLayouts/slideLayout1.xml><?xml version="1.0" encoding="utf-8"?>
 <p:sldLayout xmlns:a="http://schemas.openxmlformats.org/drawingml/2006/main" xmlns:r="http://schemas.openxmlformats.org/officeDocument/2006/relationships" xmlns:p="http://schemas.openxmlformats.org/presentationml/2006/main" type="title" preserve="1">
   <p:cSld name="Titelfolie">
@@ -258,7 +611,7 @@
           <a:p>
             <a:fld id="{1DC94265-D558-479C-B273-1E0799ACBC99}" type="datetimeFigureOut">
               <a:rPr lang="en-GB" smtClean="0"/>
-              <a:t>06/01/2025</a:t>
+              <a:t>07/01/2025</a:t>
             </a:fld>
             <a:endParaRPr lang="en-GB"/>
           </a:p>
@@ -428,7 +781,7 @@
           <a:p>
             <a:fld id="{1DC94265-D558-479C-B273-1E0799ACBC99}" type="datetimeFigureOut">
               <a:rPr lang="en-GB" smtClean="0"/>
-              <a:t>06/01/2025</a:t>
+              <a:t>07/01/2025</a:t>
             </a:fld>
             <a:endParaRPr lang="en-GB"/>
           </a:p>
@@ -608,7 +961,7 @@
           <a:p>
             <a:fld id="{1DC94265-D558-479C-B273-1E0799ACBC99}" type="datetimeFigureOut">
               <a:rPr lang="en-GB" smtClean="0"/>
-              <a:t>06/01/2025</a:t>
+              <a:t>07/01/2025</a:t>
             </a:fld>
             <a:endParaRPr lang="en-GB"/>
           </a:p>
@@ -778,7 +1131,7 @@
           <a:p>
             <a:fld id="{1DC94265-D558-479C-B273-1E0799ACBC99}" type="datetimeFigureOut">
               <a:rPr lang="en-GB" smtClean="0"/>
-              <a:t>06/01/2025</a:t>
+              <a:t>07/01/2025</a:t>
             </a:fld>
             <a:endParaRPr lang="en-GB"/>
           </a:p>
@@ -1024,7 +1377,7 @@
           <a:p>
             <a:fld id="{1DC94265-D558-479C-B273-1E0799ACBC99}" type="datetimeFigureOut">
               <a:rPr lang="en-GB" smtClean="0"/>
-              <a:t>06/01/2025</a:t>
+              <a:t>07/01/2025</a:t>
             </a:fld>
             <a:endParaRPr lang="en-GB"/>
           </a:p>
@@ -1256,7 +1609,7 @@
           <a:p>
             <a:fld id="{1DC94265-D558-479C-B273-1E0799ACBC99}" type="datetimeFigureOut">
               <a:rPr lang="en-GB" smtClean="0"/>
-              <a:t>06/01/2025</a:t>
+              <a:t>07/01/2025</a:t>
             </a:fld>
             <a:endParaRPr lang="en-GB"/>
           </a:p>
@@ -1623,7 +1976,7 @@
           <a:p>
             <a:fld id="{1DC94265-D558-479C-B273-1E0799ACBC99}" type="datetimeFigureOut">
               <a:rPr lang="en-GB" smtClean="0"/>
-              <a:t>06/01/2025</a:t>
+              <a:t>07/01/2025</a:t>
             </a:fld>
             <a:endParaRPr lang="en-GB"/>
           </a:p>
@@ -1741,7 +2094,7 @@
           <a:p>
             <a:fld id="{1DC94265-D558-479C-B273-1E0799ACBC99}" type="datetimeFigureOut">
               <a:rPr lang="en-GB" smtClean="0"/>
-              <a:t>06/01/2025</a:t>
+              <a:t>07/01/2025</a:t>
             </a:fld>
             <a:endParaRPr lang="en-GB"/>
           </a:p>
@@ -1836,7 +2189,7 @@
           <a:p>
             <a:fld id="{1DC94265-D558-479C-B273-1E0799ACBC99}" type="datetimeFigureOut">
               <a:rPr lang="en-GB" smtClean="0"/>
-              <a:t>06/01/2025</a:t>
+              <a:t>07/01/2025</a:t>
             </a:fld>
             <a:endParaRPr lang="en-GB"/>
           </a:p>
@@ -2113,7 +2466,7 @@
           <a:p>
             <a:fld id="{1DC94265-D558-479C-B273-1E0799ACBC99}" type="datetimeFigureOut">
               <a:rPr lang="en-GB" smtClean="0"/>
-              <a:t>06/01/2025</a:t>
+              <a:t>07/01/2025</a:t>
             </a:fld>
             <a:endParaRPr lang="en-GB"/>
           </a:p>
@@ -2370,7 +2723,7 @@
           <a:p>
             <a:fld id="{1DC94265-D558-479C-B273-1E0799ACBC99}" type="datetimeFigureOut">
               <a:rPr lang="en-GB" smtClean="0"/>
-              <a:t>06/01/2025</a:t>
+              <a:t>07/01/2025</a:t>
             </a:fld>
             <a:endParaRPr lang="en-GB"/>
           </a:p>
@@ -2583,7 +2936,7 @@
           <a:p>
             <a:fld id="{1DC94265-D558-479C-B273-1E0799ACBC99}" type="datetimeFigureOut">
               <a:rPr lang="en-GB" smtClean="0"/>
-              <a:t>06/01/2025</a:t>
+              <a:t>07/01/2025</a:t>
             </a:fld>
             <a:endParaRPr lang="en-GB"/>
           </a:p>
@@ -4959,7 +5312,7 @@
         </p:nvSpPr>
         <p:spPr>
           <a:xfrm>
-            <a:off x="358665" y="6258457"/>
+            <a:off x="358665" y="6581001"/>
             <a:ext cx="4937539" cy="276999"/>
           </a:xfrm>
           <a:prstGeom prst="rect">
@@ -4974,31 +5327,52 @@
           <a:lstStyle/>
           <a:p>
             <a:r>
-              <a:rPr lang="en-GB" sz="1200" b="1" dirty="0"/>
+              <a:rPr lang="en-GB" sz="1200" b="1" dirty="0">
+                <a:latin typeface="Arial" panose="020B0604020202020204" pitchFamily="34" charset="0"/>
+                <a:cs typeface="Arial" panose="020B0604020202020204" pitchFamily="34" charset="0"/>
+              </a:rPr>
               <a:t>Name</a:t>
             </a:r>
             <a:r>
-              <a:rPr lang="en-GB" sz="1200" dirty="0"/>
+              <a:rPr lang="en-GB" sz="1200" dirty="0">
+                <a:latin typeface="Arial" panose="020B0604020202020204" pitchFamily="34" charset="0"/>
+                <a:cs typeface="Arial" panose="020B0604020202020204" pitchFamily="34" charset="0"/>
+              </a:rPr>
               <a:t>: Josephina Imhoff | </a:t>
             </a:r>
             <a:r>
-              <a:rPr lang="en-GB" sz="1200" b="1" dirty="0"/>
+              <a:rPr lang="en-GB" sz="1200" b="1" dirty="0">
+                <a:latin typeface="Arial" panose="020B0604020202020204" pitchFamily="34" charset="0"/>
+                <a:cs typeface="Arial" panose="020B0604020202020204" pitchFamily="34" charset="0"/>
+              </a:rPr>
               <a:t>Matriculation No.: </a:t>
             </a:r>
             <a:r>
-              <a:rPr lang="en-GB" sz="1200" dirty="0"/>
+              <a:rPr lang="en-GB" sz="1200" dirty="0">
+                <a:latin typeface="Arial" panose="020B0604020202020204" pitchFamily="34" charset="0"/>
+                <a:cs typeface="Arial" panose="020B0604020202020204" pitchFamily="34" charset="0"/>
+              </a:rPr>
               <a:t>23464631 | </a:t>
             </a:r>
             <a:r>
-              <a:rPr lang="en-GB" sz="1200" b="1" dirty="0" err="1"/>
+              <a:rPr lang="en-GB" sz="1200" b="1" dirty="0" err="1">
+                <a:latin typeface="Arial" panose="020B0604020202020204" pitchFamily="34" charset="0"/>
+                <a:cs typeface="Arial" panose="020B0604020202020204" pitchFamily="34" charset="0"/>
+              </a:rPr>
               <a:t>IdM</a:t>
             </a:r>
             <a:r>
-              <a:rPr lang="en-GB" sz="1200" b="1" dirty="0"/>
+              <a:rPr lang="en-GB" sz="1200" b="1" dirty="0">
+                <a:latin typeface="Arial" panose="020B0604020202020204" pitchFamily="34" charset="0"/>
+                <a:cs typeface="Arial" panose="020B0604020202020204" pitchFamily="34" charset="0"/>
+              </a:rPr>
               <a:t>:</a:t>
             </a:r>
             <a:r>
-              <a:rPr lang="en-GB" sz="1200" dirty="0"/>
+              <a:rPr lang="en-GB" sz="1200" dirty="0">
+                <a:latin typeface="Arial" panose="020B0604020202020204" pitchFamily="34" charset="0"/>
+                <a:cs typeface="Arial" panose="020B0604020202020204" pitchFamily="34" charset="0"/>
+              </a:rPr>
               <a:t> jo17wila</a:t>
             </a:r>
           </a:p>
@@ -5018,7 +5392,7 @@
         </p:nvSpPr>
         <p:spPr>
           <a:xfrm>
-            <a:off x="358666" y="322544"/>
+            <a:off x="358664" y="45856"/>
             <a:ext cx="4722428" cy="461665"/>
           </a:xfrm>
           <a:prstGeom prst="rect">
@@ -5033,18 +5407,307 @@
           <a:lstStyle/>
           <a:p>
             <a:r>
-              <a:rPr lang="en-GB" sz="2400" b="1" dirty="0"/>
+              <a:rPr lang="en-GB" sz="2400" b="1" dirty="0">
+                <a:latin typeface="Arial" panose="020B0604020202020204" pitchFamily="34" charset="0"/>
+                <a:cs typeface="Arial" panose="020B0604020202020204" pitchFamily="34" charset="0"/>
+              </a:rPr>
               <a:t>Homework 8</a:t>
+            </a:r>
+          </a:p>
+        </p:txBody>
+      </p:sp>
+      <p:sp>
+        <p:nvSpPr>
+          <p:cNvPr id="6" name="Textfeld 5">
+            <a:extLst>
+              <a:ext uri="{FF2B5EF4-FFF2-40B4-BE49-F238E27FC236}">
+                <a16:creationId xmlns:a16="http://schemas.microsoft.com/office/drawing/2014/main" id="{20C90885-5A6C-8504-D61C-29B7084E47A8}"/>
+              </a:ext>
+            </a:extLst>
+          </p:cNvPr>
+          <p:cNvSpPr txBox="1"/>
+          <p:nvPr/>
+        </p:nvSpPr>
+        <p:spPr>
+          <a:xfrm>
+            <a:off x="5580993" y="322544"/>
+            <a:ext cx="3966341" cy="3701013"/>
+          </a:xfrm>
+          <a:prstGeom prst="rect">
+            <a:avLst/>
+          </a:prstGeom>
+          <a:noFill/>
+        </p:spPr>
+        <p:txBody>
+          <a:bodyPr wrap="square" rtlCol="0">
+            <a:spAutoFit/>
+          </a:bodyPr>
+          <a:lstStyle/>
+          <a:p>
+            <a:pPr marL="180975" indent="-180975"/>
+            <a:r>
+              <a:rPr lang="en-GB" sz="1400" dirty="0">
+                <a:latin typeface="Arial" panose="020B0604020202020204" pitchFamily="34" charset="0"/>
+                <a:cs typeface="Arial" panose="020B0604020202020204" pitchFamily="34" charset="0"/>
+              </a:rPr>
+              <a:t>Answers to Questions:</a:t>
+            </a:r>
+          </a:p>
+          <a:p>
+            <a:pPr marL="180975" indent="-180975"/>
+            <a:endParaRPr lang="en-GB" sz="1050" dirty="0">
+              <a:latin typeface="Arial" panose="020B0604020202020204" pitchFamily="34" charset="0"/>
+              <a:cs typeface="Arial" panose="020B0604020202020204" pitchFamily="34" charset="0"/>
+            </a:endParaRPr>
+          </a:p>
+          <a:p>
+            <a:pPr marL="180975" indent="-180975"/>
+            <a:r>
+              <a:rPr lang="en-GB" sz="1050" dirty="0">
+                <a:latin typeface="Arial" panose="020B0604020202020204" pitchFamily="34" charset="0"/>
+                <a:cs typeface="Arial" panose="020B0604020202020204" pitchFamily="34" charset="0"/>
+              </a:rPr>
+              <a:t>Five Activation Functions: </a:t>
+            </a:r>
+          </a:p>
+          <a:p>
+            <a:pPr marL="357188" indent="-180975" defTabSz="446088">
+              <a:buFont typeface="+mj-lt"/>
+              <a:buAutoNum type="arabicPeriod"/>
+            </a:pPr>
+            <a:r>
+              <a:rPr lang="en-GB" sz="1050" dirty="0">
+                <a:latin typeface="Arial" panose="020B0604020202020204" pitchFamily="34" charset="0"/>
+                <a:cs typeface="Arial" panose="020B0604020202020204" pitchFamily="34" charset="0"/>
+              </a:rPr>
+              <a:t>(Leaky) </a:t>
+            </a:r>
+            <a:r>
+              <a:rPr lang="en-GB" sz="1050" dirty="0" err="1">
+                <a:latin typeface="Arial" panose="020B0604020202020204" pitchFamily="34" charset="0"/>
+                <a:cs typeface="Arial" panose="020B0604020202020204" pitchFamily="34" charset="0"/>
+              </a:rPr>
+              <a:t>ReLU</a:t>
+            </a:r>
+            <a:endParaRPr lang="en-GB" sz="1050" dirty="0">
+              <a:latin typeface="Arial" panose="020B0604020202020204" pitchFamily="34" charset="0"/>
+              <a:cs typeface="Arial" panose="020B0604020202020204" pitchFamily="34" charset="0"/>
+            </a:endParaRPr>
+          </a:p>
+          <a:p>
+            <a:pPr marL="357188" indent="-180975" defTabSz="446088">
+              <a:buFont typeface="+mj-lt"/>
+              <a:buAutoNum type="arabicPeriod"/>
+            </a:pPr>
+            <a:r>
+              <a:rPr lang="en-GB" sz="1050" dirty="0">
+                <a:latin typeface="Arial" panose="020B0604020202020204" pitchFamily="34" charset="0"/>
+                <a:cs typeface="Arial" panose="020B0604020202020204" pitchFamily="34" charset="0"/>
+              </a:rPr>
+              <a:t>Sigmoid function (or hyperbolic tangent)</a:t>
+            </a:r>
+          </a:p>
+          <a:p>
+            <a:pPr marL="357188" indent="-180975" defTabSz="446088">
+              <a:buFont typeface="+mj-lt"/>
+              <a:buAutoNum type="arabicPeriod"/>
+            </a:pPr>
+            <a:r>
+              <a:rPr lang="en-GB" sz="1050" dirty="0">
+                <a:latin typeface="Arial" panose="020B0604020202020204" pitchFamily="34" charset="0"/>
+                <a:cs typeface="Arial" panose="020B0604020202020204" pitchFamily="34" charset="0"/>
+              </a:rPr>
+              <a:t>Linear function</a:t>
+            </a:r>
+          </a:p>
+          <a:p>
+            <a:pPr marL="357188" indent="-180975" defTabSz="446088">
+              <a:buFont typeface="+mj-lt"/>
+              <a:buAutoNum type="arabicPeriod"/>
+            </a:pPr>
+            <a:r>
+              <a:rPr lang="en-GB" sz="1050" dirty="0">
+                <a:latin typeface="Arial" panose="020B0604020202020204" pitchFamily="34" charset="0"/>
+                <a:cs typeface="Arial" panose="020B0604020202020204" pitchFamily="34" charset="0"/>
+              </a:rPr>
+              <a:t>Step function (signum or unit step)</a:t>
+            </a:r>
+          </a:p>
+          <a:p>
+            <a:pPr marL="357188" indent="-180975" defTabSz="446088">
+              <a:buFont typeface="+mj-lt"/>
+              <a:buAutoNum type="arabicPeriod"/>
+            </a:pPr>
+            <a:r>
+              <a:rPr lang="en-GB" sz="1050" dirty="0">
+                <a:latin typeface="Arial" panose="020B0604020202020204" pitchFamily="34" charset="0"/>
+                <a:cs typeface="Arial" panose="020B0604020202020204" pitchFamily="34" charset="0"/>
+              </a:rPr>
+              <a:t>Piecewise </a:t>
+            </a:r>
+            <a:r>
+              <a:rPr lang="en-GB" sz="1050">
+                <a:latin typeface="Arial" panose="020B0604020202020204" pitchFamily="34" charset="0"/>
+                <a:cs typeface="Arial" panose="020B0604020202020204" pitchFamily="34" charset="0"/>
+              </a:rPr>
+              <a:t>linear function</a:t>
+            </a:r>
+            <a:endParaRPr lang="en-GB" sz="1050" dirty="0">
+              <a:latin typeface="Arial" panose="020B0604020202020204" pitchFamily="34" charset="0"/>
+              <a:cs typeface="Arial" panose="020B0604020202020204" pitchFamily="34" charset="0"/>
+            </a:endParaRPr>
+          </a:p>
+          <a:p>
+            <a:pPr marL="180975" indent="-180975"/>
+            <a:r>
+              <a:rPr lang="en-GB" sz="1050" dirty="0">
+                <a:latin typeface="Arial" panose="020B0604020202020204" pitchFamily="34" charset="0"/>
+                <a:cs typeface="Arial" panose="020B0604020202020204" pitchFamily="34" charset="0"/>
+              </a:rPr>
+              <a:t>Adam: </a:t>
+            </a:r>
+            <a:br>
+              <a:rPr lang="en-GB" sz="1050" dirty="0">
+                <a:latin typeface="Arial" panose="020B0604020202020204" pitchFamily="34" charset="0"/>
+                <a:cs typeface="Arial" panose="020B0604020202020204" pitchFamily="34" charset="0"/>
+              </a:rPr>
+            </a:br>
+            <a:r>
+              <a:rPr lang="en-GB" sz="1050" i="1" dirty="0">
+                <a:latin typeface="Arial" panose="020B0604020202020204" pitchFamily="34" charset="0"/>
+                <a:cs typeface="Arial" panose="020B0604020202020204" pitchFamily="34" charset="0"/>
+              </a:rPr>
+              <a:t>Adam</a:t>
+            </a:r>
+            <a:r>
+              <a:rPr lang="en-GB" sz="1050" dirty="0">
+                <a:latin typeface="Arial" panose="020B0604020202020204" pitchFamily="34" charset="0"/>
+                <a:cs typeface="Arial" panose="020B0604020202020204" pitchFamily="34" charset="0"/>
+              </a:rPr>
+              <a:t> is an optimizer based on stochastic gradient descent using adaptive moment estimation, helping the algorithm converge a local minimum faster.</a:t>
+            </a:r>
+          </a:p>
+          <a:p>
+            <a:pPr marL="180975" indent="-180975"/>
+            <a:r>
+              <a:rPr lang="en-GB" sz="1050" dirty="0" err="1">
+                <a:latin typeface="Arial" panose="020B0604020202020204" pitchFamily="34" charset="0"/>
+                <a:cs typeface="Arial" panose="020B0604020202020204" pitchFamily="34" charset="0"/>
+              </a:rPr>
+              <a:t>sparse_categorical_crossentropy</a:t>
+            </a:r>
+            <a:r>
+              <a:rPr lang="en-GB" sz="1050" dirty="0">
+                <a:latin typeface="Arial" panose="020B0604020202020204" pitchFamily="34" charset="0"/>
+                <a:cs typeface="Arial" panose="020B0604020202020204" pitchFamily="34" charset="0"/>
+              </a:rPr>
+              <a:t>:</a:t>
+            </a:r>
+          </a:p>
+          <a:p>
+            <a:pPr marL="357188" indent="-180975">
+              <a:buFont typeface="Arial" panose="020B0604020202020204" pitchFamily="34" charset="0"/>
+              <a:buChar char="•"/>
+            </a:pPr>
+            <a:r>
+              <a:rPr lang="en-GB" sz="1050" dirty="0">
+                <a:latin typeface="Arial" panose="020B0604020202020204" pitchFamily="34" charset="0"/>
+                <a:cs typeface="Arial" panose="020B0604020202020204" pitchFamily="34" charset="0"/>
+              </a:rPr>
+              <a:t>Loss-function for </a:t>
+            </a:r>
+            <a:r>
+              <a:rPr lang="en-US" sz="1050" dirty="0">
+                <a:latin typeface="Arial" panose="020B0604020202020204" pitchFamily="34" charset="0"/>
+                <a:cs typeface="Arial" panose="020B0604020202020204" pitchFamily="34" charset="0"/>
+              </a:rPr>
+              <a:t>classification tasks with mutually exclusive classes</a:t>
+            </a:r>
+          </a:p>
+          <a:p>
+            <a:pPr marL="357188" indent="-180975">
+              <a:buFont typeface="Arial" panose="020B0604020202020204" pitchFamily="34" charset="0"/>
+              <a:buChar char="•"/>
+            </a:pPr>
+            <a:r>
+              <a:rPr lang="en-US" sz="1050" dirty="0">
+                <a:latin typeface="Arial" panose="020B0604020202020204" pitchFamily="34" charset="0"/>
+                <a:cs typeface="Arial" panose="020B0604020202020204" pitchFamily="34" charset="0"/>
+              </a:rPr>
+              <a:t>expects integer labels (not one-hot encoded)</a:t>
+            </a:r>
+          </a:p>
+          <a:p>
+            <a:pPr marL="357188" indent="-180975">
+              <a:buFont typeface="Arial" panose="020B0604020202020204" pitchFamily="34" charset="0"/>
+              <a:buChar char="•"/>
+            </a:pPr>
+            <a:r>
+              <a:rPr lang="en-US" sz="1050" dirty="0">
+                <a:latin typeface="Arial" panose="020B0604020202020204" pitchFamily="34" charset="0"/>
+                <a:cs typeface="Arial" panose="020B0604020202020204" pitchFamily="34" charset="0"/>
+              </a:rPr>
+              <a:t>computes the cross-entropy loss</a:t>
+            </a:r>
+          </a:p>
+          <a:p>
+            <a:pPr marL="357188" indent="-180975">
+              <a:buFont typeface="Arial" panose="020B0604020202020204" pitchFamily="34" charset="0"/>
+              <a:buChar char="•"/>
+            </a:pPr>
+            <a:r>
+              <a:rPr lang="en-US" sz="1050" dirty="0">
+                <a:latin typeface="Arial" panose="020B0604020202020204" pitchFamily="34" charset="0"/>
+                <a:cs typeface="Arial" panose="020B0604020202020204" pitchFamily="34" charset="0"/>
+              </a:rPr>
+              <a:t>particularly useful for multi-class problems where the target is a single class index</a:t>
+            </a:r>
+          </a:p>
+          <a:p>
+            <a:pPr marL="176213" indent="-176213"/>
+            <a:r>
+              <a:rPr lang="en-US" sz="1050" dirty="0">
+                <a:latin typeface="Arial" panose="020B0604020202020204" pitchFamily="34" charset="0"/>
+                <a:cs typeface="Arial" panose="020B0604020202020204" pitchFamily="34" charset="0"/>
+              </a:rPr>
+              <a:t>Epoch:</a:t>
+            </a:r>
+            <a:br>
+              <a:rPr lang="en-US" sz="1050" dirty="0">
+                <a:latin typeface="Arial" panose="020B0604020202020204" pitchFamily="34" charset="0"/>
+                <a:cs typeface="Arial" panose="020B0604020202020204" pitchFamily="34" charset="0"/>
+              </a:rPr>
+            </a:br>
+            <a:r>
+              <a:rPr lang="en-US" sz="1050" dirty="0">
+                <a:latin typeface="Arial" panose="020B0604020202020204" pitchFamily="34" charset="0"/>
+                <a:cs typeface="Arial" panose="020B0604020202020204" pitchFamily="34" charset="0"/>
+              </a:rPr>
+              <a:t>An </a:t>
+            </a:r>
+            <a:r>
+              <a:rPr lang="en-US" sz="1050" i="1" dirty="0">
+                <a:latin typeface="Arial" panose="020B0604020202020204" pitchFamily="34" charset="0"/>
+                <a:cs typeface="Arial" panose="020B0604020202020204" pitchFamily="34" charset="0"/>
+              </a:rPr>
+              <a:t>epoch</a:t>
+            </a:r>
+            <a:r>
+              <a:rPr lang="en-US" sz="1050" dirty="0">
+                <a:latin typeface="Arial" panose="020B0604020202020204" pitchFamily="34" charset="0"/>
+                <a:cs typeface="Arial" panose="020B0604020202020204" pitchFamily="34" charset="0"/>
+              </a:rPr>
+              <a:t> is one complete pass through the whole training set during the training of a ML model.</a:t>
             </a:r>
           </a:p>
         </p:txBody>
       </p:sp>
       <p:pic>
         <p:nvPicPr>
-          <p:cNvPr id="3" name="Grafik 2" descr="Ein Bild, das Diagramm enthält.&#10;&#10;Automatisch generierte Beschreibung">
+          <p:cNvPr id="7" name="Grafik 6" descr="Ein Bild, das Text, Screenshot enthält.&#10;&#10;Automatisch generierte Beschreibung">
             <a:extLst>
               <a:ext uri="{FF2B5EF4-FFF2-40B4-BE49-F238E27FC236}">
-                <a16:creationId xmlns:a16="http://schemas.microsoft.com/office/drawing/2014/main" id="{C5D343C7-161C-03A7-CBA0-215348CAE662}"/>
+                <a16:creationId xmlns:a16="http://schemas.microsoft.com/office/drawing/2014/main" id="{DEFA907E-F358-35CE-FCEB-A15B53495E95}"/>
               </a:ext>
             </a:extLst>
           </p:cNvPr>
@@ -5061,25 +5724,242 @@
               </a:ext>
             </a:extLst>
           </a:blip>
-          <a:srcRect l="17448" t="5476" r="17532" b="4469"/>
-          <a:stretch/>
+          <a:stretch>
+            <a:fillRect/>
+          </a:stretch>
         </p:blipFill>
         <p:spPr>
           <a:xfrm>
-            <a:off x="358665" y="3748957"/>
-            <a:ext cx="2013367" cy="2091404"/>
+            <a:off x="358664" y="784209"/>
+            <a:ext cx="5101249" cy="3669804"/>
+          </a:xfrm>
+          <a:prstGeom prst="rect">
+            <a:avLst/>
+          </a:prstGeom>
+          <a:ln>
+            <a:solidFill>
+              <a:schemeClr val="tx1"/>
+            </a:solidFill>
+          </a:ln>
+        </p:spPr>
+      </p:pic>
+      <p:pic>
+        <p:nvPicPr>
+          <p:cNvPr id="9" name="Grafik 8">
+            <a:extLst>
+              <a:ext uri="{FF2B5EF4-FFF2-40B4-BE49-F238E27FC236}">
+                <a16:creationId xmlns:a16="http://schemas.microsoft.com/office/drawing/2014/main" id="{300A5B52-D123-D925-479D-1182361C3ED1}"/>
+              </a:ext>
+            </a:extLst>
+          </p:cNvPr>
+          <p:cNvPicPr>
+            <a:picLocks noChangeAspect="1"/>
+          </p:cNvPicPr>
+          <p:nvPr/>
+        </p:nvPicPr>
+        <p:blipFill>
+          <a:blip r:embed="rId3">
+            <a:extLst>
+              <a:ext uri="{28A0092B-C50C-407E-A947-70E740481C1C}">
+                <a14:useLocalDpi xmlns:a14="http://schemas.microsoft.com/office/drawing/2010/main" val="0"/>
+              </a:ext>
+            </a:extLst>
+          </a:blip>
+          <a:stretch>
+            <a:fillRect/>
+          </a:stretch>
+        </p:blipFill>
+        <p:spPr>
+          <a:xfrm>
+            <a:off x="5580993" y="4293567"/>
+            <a:ext cx="2739476" cy="320892"/>
           </a:xfrm>
           <a:prstGeom prst="rect">
             <a:avLst/>
           </a:prstGeom>
         </p:spPr>
       </p:pic>
-      <p:sp>
-        <p:nvSpPr>
-          <p:cNvPr id="6" name="Textfeld 5">
+      <p:pic>
+        <p:nvPicPr>
+          <p:cNvPr id="3" name="Grafik 2" descr="Ein Bild, das Diagramm enthält.&#10;&#10;Automatisch generierte Beschreibung">
             <a:extLst>
               <a:ext uri="{FF2B5EF4-FFF2-40B4-BE49-F238E27FC236}">
-                <a16:creationId xmlns:a16="http://schemas.microsoft.com/office/drawing/2014/main" id="{20C90885-5A6C-8504-D61C-29B7084E47A8}"/>
+                <a16:creationId xmlns:a16="http://schemas.microsoft.com/office/drawing/2014/main" id="{C5D343C7-161C-03A7-CBA0-215348CAE662}"/>
+              </a:ext>
+            </a:extLst>
+          </p:cNvPr>
+          <p:cNvPicPr>
+            <a:picLocks noChangeAspect="1"/>
+          </p:cNvPicPr>
+          <p:nvPr/>
+        </p:nvPicPr>
+        <p:blipFill>
+          <a:blip r:embed="rId4">
+            <a:extLst>
+              <a:ext uri="{28A0092B-C50C-407E-A947-70E740481C1C}">
+                <a14:useLocalDpi xmlns:a14="http://schemas.microsoft.com/office/drawing/2010/main" val="0"/>
+              </a:ext>
+            </a:extLst>
+          </a:blip>
+          <a:srcRect l="17448" t="5476" r="17532" b="4469"/>
+          <a:stretch/>
+        </p:blipFill>
+        <p:spPr>
+          <a:xfrm>
+            <a:off x="358664" y="4454013"/>
+            <a:ext cx="2003777" cy="2081443"/>
+          </a:xfrm>
+          <a:prstGeom prst="rect">
+            <a:avLst/>
+          </a:prstGeom>
+          <a:ln>
+            <a:solidFill>
+              <a:schemeClr val="tx1"/>
+            </a:solidFill>
+          </a:ln>
+        </p:spPr>
+      </p:pic>
+      <p:pic>
+        <p:nvPicPr>
+          <p:cNvPr id="11" name="Grafik 10" descr="Ein Bild, das Text, Screenshot, Reihe, Diagramm enthält.&#10;&#10;Automatisch generierte Beschreibung">
+            <a:extLst>
+              <a:ext uri="{FF2B5EF4-FFF2-40B4-BE49-F238E27FC236}">
+                <a16:creationId xmlns:a16="http://schemas.microsoft.com/office/drawing/2014/main" id="{528B3114-425C-BB72-1338-E3C321568E7F}"/>
+              </a:ext>
+            </a:extLst>
+          </p:cNvPr>
+          <p:cNvPicPr>
+            <a:picLocks noChangeAspect="1"/>
+          </p:cNvPicPr>
+          <p:nvPr/>
+        </p:nvPicPr>
+        <p:blipFill>
+          <a:blip r:embed="rId5">
+            <a:extLst>
+              <a:ext uri="{28A0092B-C50C-407E-A947-70E740481C1C}">
+                <a14:useLocalDpi xmlns:a14="http://schemas.microsoft.com/office/drawing/2010/main" val="0"/>
+              </a:ext>
+            </a:extLst>
+          </a:blip>
+          <a:srcRect t="8540" r="7661"/>
+          <a:stretch/>
+        </p:blipFill>
+        <p:spPr>
+          <a:xfrm>
+            <a:off x="2365827" y="3979985"/>
+            <a:ext cx="3096029" cy="2555471"/>
+          </a:xfrm>
+          <a:prstGeom prst="rect">
+            <a:avLst/>
+          </a:prstGeom>
+          <a:ln>
+            <a:solidFill>
+              <a:schemeClr val="tx1"/>
+            </a:solidFill>
+          </a:ln>
+        </p:spPr>
+      </p:pic>
+      <p:grpSp>
+        <p:nvGrpSpPr>
+          <p:cNvPr id="16" name="Gruppieren 15">
+            <a:extLst>
+              <a:ext uri="{FF2B5EF4-FFF2-40B4-BE49-F238E27FC236}">
+                <a16:creationId xmlns:a16="http://schemas.microsoft.com/office/drawing/2014/main" id="{9494C0F5-F3D4-6ED4-E816-B2826D2F1D8B}"/>
+              </a:ext>
+            </a:extLst>
+          </p:cNvPr>
+          <p:cNvGrpSpPr/>
+          <p:nvPr/>
+        </p:nvGrpSpPr>
+        <p:grpSpPr>
+          <a:xfrm>
+            <a:off x="5542345" y="5319055"/>
+            <a:ext cx="4257320" cy="1216401"/>
+            <a:chOff x="5580993" y="4962216"/>
+            <a:chExt cx="4257320" cy="1216401"/>
+          </a:xfrm>
+        </p:grpSpPr>
+        <p:pic>
+          <p:nvPicPr>
+            <p:cNvPr id="14" name="Grafik 13" descr="Ein Bild, das Text, Screenshot, Schrift enthält.&#10;&#10;Automatisch generierte Beschreibung">
+              <a:extLst>
+                <a:ext uri="{FF2B5EF4-FFF2-40B4-BE49-F238E27FC236}">
+                  <a16:creationId xmlns:a16="http://schemas.microsoft.com/office/drawing/2014/main" id="{9D06C475-BC9A-C099-98C9-F2201F9F8198}"/>
+                </a:ext>
+              </a:extLst>
+            </p:cNvPr>
+            <p:cNvPicPr>
+              <a:picLocks noChangeAspect="1"/>
+            </p:cNvPicPr>
+            <p:nvPr/>
+          </p:nvPicPr>
+          <p:blipFill>
+            <a:blip r:embed="rId6">
+              <a:extLst>
+                <a:ext uri="{28A0092B-C50C-407E-A947-70E740481C1C}">
+                  <a14:useLocalDpi xmlns:a14="http://schemas.microsoft.com/office/drawing/2010/main" val="0"/>
+                </a:ext>
+              </a:extLst>
+            </a:blip>
+            <a:stretch>
+              <a:fillRect/>
+            </a:stretch>
+          </p:blipFill>
+          <p:spPr>
+            <a:xfrm>
+              <a:off x="5580993" y="5216132"/>
+              <a:ext cx="4257320" cy="962485"/>
+            </a:xfrm>
+            <a:prstGeom prst="rect">
+              <a:avLst/>
+            </a:prstGeom>
+          </p:spPr>
+        </p:pic>
+        <p:sp>
+          <p:nvSpPr>
+            <p:cNvPr id="15" name="Textfeld 14">
+              <a:extLst>
+                <a:ext uri="{FF2B5EF4-FFF2-40B4-BE49-F238E27FC236}">
+                  <a16:creationId xmlns:a16="http://schemas.microsoft.com/office/drawing/2014/main" id="{89652D2C-7E88-3074-736D-C43A114C1AE5}"/>
+                </a:ext>
+              </a:extLst>
+            </p:cNvPr>
+            <p:cNvSpPr txBox="1"/>
+            <p:nvPr/>
+          </p:nvSpPr>
+          <p:spPr>
+            <a:xfrm>
+              <a:off x="6177558" y="4962216"/>
+              <a:ext cx="1822935" cy="253916"/>
+            </a:xfrm>
+            <a:prstGeom prst="rect">
+              <a:avLst/>
+            </a:prstGeom>
+            <a:noFill/>
+          </p:spPr>
+          <p:txBody>
+            <a:bodyPr wrap="none" rtlCol="0">
+              <a:spAutoFit/>
+            </a:bodyPr>
+            <a:lstStyle/>
+            <a:p>
+              <a:r>
+                <a:rPr lang="en-GB" sz="1050" dirty="0">
+                  <a:latin typeface="Arial" panose="020B0604020202020204" pitchFamily="34" charset="0"/>
+                  <a:cs typeface="Arial" panose="020B0604020202020204" pitchFamily="34" charset="0"/>
+                </a:rPr>
+                <a:t>Compile and evaluate CNN</a:t>
+              </a:r>
+            </a:p>
+          </p:txBody>
+        </p:sp>
+      </p:grpSp>
+      <p:sp>
+        <p:nvSpPr>
+          <p:cNvPr id="19" name="Textfeld 18">
+            <a:extLst>
+              <a:ext uri="{FF2B5EF4-FFF2-40B4-BE49-F238E27FC236}">
+                <a16:creationId xmlns:a16="http://schemas.microsoft.com/office/drawing/2014/main" id="{411605DF-9C50-63AC-9E88-B32ACDE4A8DE}"/>
               </a:ext>
             </a:extLst>
           </p:cNvPr>
@@ -5088,8 +5968,8 @@
         </p:nvSpPr>
         <p:spPr>
           <a:xfrm>
-            <a:off x="5860026" y="322544"/>
-            <a:ext cx="3687308" cy="3862596"/>
+            <a:off x="2917288" y="507521"/>
+            <a:ext cx="816249" cy="253916"/>
           </a:xfrm>
           <a:prstGeom prst="rect">
             <a:avLst/>
@@ -5097,176 +5977,17 @@
           <a:noFill/>
         </p:spPr>
         <p:txBody>
-          <a:bodyPr wrap="square" rtlCol="0">
+          <a:bodyPr wrap="none" rtlCol="0">
             <a:spAutoFit/>
           </a:bodyPr>
           <a:lstStyle/>
           <a:p>
-            <a:pPr marL="180975" indent="-180975"/>
-            <a:r>
-              <a:rPr lang="en-GB" sz="1400" dirty="0"/>
-              <a:t>Answers to Questions:</a:t>
-            </a:r>
-          </a:p>
-          <a:p>
-            <a:pPr marL="180975" indent="-180975"/>
-            <a:endParaRPr lang="en-GB" sz="1100" dirty="0"/>
-          </a:p>
-          <a:p>
-            <a:pPr marL="180975" indent="-180975"/>
-            <a:r>
-              <a:rPr lang="en-GB" sz="1100" dirty="0"/>
-              <a:t>Five Activation Functions: </a:t>
-            </a:r>
-          </a:p>
-          <a:p>
-            <a:pPr marL="357188" indent="-180975" defTabSz="446088">
-              <a:buFont typeface="+mj-lt"/>
-              <a:buAutoNum type="arabicPeriod"/>
-            </a:pPr>
-            <a:r>
-              <a:rPr lang="en-GB" sz="1100" dirty="0"/>
-              <a:t>(Leaky) </a:t>
-            </a:r>
-            <a:r>
-              <a:rPr lang="en-GB" sz="1100" dirty="0" err="1"/>
-              <a:t>ReLU</a:t>
-            </a:r>
-            <a:endParaRPr lang="en-GB" sz="1100" dirty="0"/>
-          </a:p>
-          <a:p>
-            <a:pPr marL="357188" indent="-180975" defTabSz="446088">
-              <a:buFont typeface="+mj-lt"/>
-              <a:buAutoNum type="arabicPeriod"/>
-            </a:pPr>
-            <a:r>
-              <a:rPr lang="en-GB" sz="1100" dirty="0"/>
-              <a:t>Sigmoid function (or hyperbolic tangent)</a:t>
-            </a:r>
-          </a:p>
-          <a:p>
-            <a:pPr marL="357188" indent="-180975" defTabSz="446088">
-              <a:buFont typeface="+mj-lt"/>
-              <a:buAutoNum type="arabicPeriod"/>
-            </a:pPr>
-            <a:r>
-              <a:rPr lang="en-GB" sz="1100" dirty="0"/>
-              <a:t>Linear function</a:t>
-            </a:r>
-          </a:p>
-          <a:p>
-            <a:pPr marL="357188" indent="-180975" defTabSz="446088">
-              <a:buFont typeface="+mj-lt"/>
-              <a:buAutoNum type="arabicPeriod"/>
-            </a:pPr>
-            <a:r>
-              <a:rPr lang="en-GB" sz="1100" dirty="0"/>
-              <a:t>Step function (signum or unit step)</a:t>
-            </a:r>
-          </a:p>
-          <a:p>
-            <a:pPr marL="357188" indent="-180975" defTabSz="446088">
-              <a:buFont typeface="+mj-lt"/>
-              <a:buAutoNum type="arabicPeriod"/>
-            </a:pPr>
-            <a:r>
-              <a:rPr lang="en-GB" sz="1100" dirty="0"/>
-              <a:t>Piecewise linear</a:t>
-            </a:r>
-          </a:p>
-          <a:p>
-            <a:pPr marL="180975" indent="-180975"/>
-            <a:r>
-              <a:rPr lang="en-GB" sz="1100" dirty="0"/>
-              <a:t>Adam: </a:t>
-            </a:r>
-            <a:br>
-              <a:rPr lang="en-GB" sz="1100" dirty="0"/>
-            </a:br>
-            <a:r>
-              <a:rPr lang="en-GB" sz="1100" i="1" dirty="0"/>
-              <a:t>Adam</a:t>
-            </a:r>
-            <a:r>
-              <a:rPr lang="en-GB" sz="1100" dirty="0"/>
-              <a:t> is an optimizer based on stochastic gradient descent using adaptive moment estimation, helping the algorithm converge a local minimum faster.</a:t>
-            </a:r>
-          </a:p>
-          <a:p>
-            <a:pPr marL="180975" indent="-180975"/>
-            <a:r>
-              <a:rPr lang="en-GB" sz="1100" dirty="0" err="1"/>
-              <a:t>sparse_categorical_crossentropy</a:t>
-            </a:r>
-            <a:r>
-              <a:rPr lang="en-GB" sz="1100" dirty="0"/>
-              <a:t>:</a:t>
-            </a:r>
-          </a:p>
-          <a:p>
-            <a:pPr marL="357188" indent="-180975">
-              <a:buFont typeface="Arial" panose="020B0604020202020204" pitchFamily="34" charset="0"/>
-              <a:buChar char="•"/>
-            </a:pPr>
-            <a:r>
-              <a:rPr lang="en-GB" sz="1100" dirty="0"/>
-              <a:t>Loss-function for </a:t>
-            </a:r>
-            <a:r>
-              <a:rPr lang="en-US" sz="1100" dirty="0"/>
-              <a:t>classification tasks with mutually exclusive classes</a:t>
-            </a:r>
-          </a:p>
-          <a:p>
-            <a:pPr marL="357188" indent="-180975">
-              <a:buFont typeface="Arial" panose="020B0604020202020204" pitchFamily="34" charset="0"/>
-              <a:buChar char="•"/>
-            </a:pPr>
-            <a:r>
-              <a:rPr lang="en-US" sz="1100" dirty="0"/>
-              <a:t>expects integer labels (not one-hot encoded)</a:t>
-            </a:r>
-          </a:p>
-          <a:p>
-            <a:pPr marL="357188" indent="-180975">
-              <a:buFont typeface="Arial" panose="020B0604020202020204" pitchFamily="34" charset="0"/>
-              <a:buChar char="•"/>
-            </a:pPr>
-            <a:r>
-              <a:rPr lang="en-US" sz="1100" dirty="0"/>
-              <a:t>computes the cross-entropy loss</a:t>
-            </a:r>
-          </a:p>
-          <a:p>
-            <a:pPr marL="357188" indent="-180975">
-              <a:buFont typeface="Arial" panose="020B0604020202020204" pitchFamily="34" charset="0"/>
-              <a:buChar char="•"/>
-            </a:pPr>
-            <a:r>
-              <a:rPr lang="en-US" sz="1100" dirty="0"/>
-              <a:t>particularly useful for multi-class problems where the target is a single class index</a:t>
-            </a:r>
-          </a:p>
-          <a:p>
-            <a:pPr marL="176213" indent="-176213"/>
-            <a:r>
-              <a:rPr lang="en-US" sz="1100" dirty="0"/>
-              <a:t>Epoch:</a:t>
-            </a:r>
-            <a:br>
-              <a:rPr lang="en-US" sz="1100" dirty="0"/>
-            </a:br>
-            <a:r>
-              <a:rPr lang="en-US" sz="1100" dirty="0"/>
-              <a:t>An </a:t>
-            </a:r>
-            <a:r>
-              <a:rPr lang="en-US" sz="1100" i="1" dirty="0"/>
-              <a:t>epoch</a:t>
-            </a:r>
-            <a:r>
-              <a:rPr lang="en-US" sz="1100" dirty="0"/>
-              <a:t> is one complete pass through the whole training set during the training of a ML model.</a:t>
+            <a:r>
+              <a:rPr lang="en-GB" sz="1050" dirty="0">
+                <a:latin typeface="Arial" panose="020B0604020202020204" pitchFamily="34" charset="0"/>
+                <a:cs typeface="Arial" panose="020B0604020202020204" pitchFamily="34" charset="0"/>
+              </a:rPr>
+              <a:t>Build CNN</a:t>
             </a:r>
           </a:p>
         </p:txBody>
@@ -5597,4 +6318,319 @@
     </a:ext>
   </a:extLst>
 </a:theme>
+</file>
+
+<file path=ppt/theme/theme2.xml><?xml version="1.0" encoding="utf-8"?>
+<a:theme xmlns:a="http://schemas.openxmlformats.org/drawingml/2006/main" name="Office">
+  <a:themeElements>
+    <a:clrScheme name="Office">
+      <a:dk1>
+        <a:sysClr val="windowText" lastClr="000000"/>
+      </a:dk1>
+      <a:lt1>
+        <a:sysClr val="window" lastClr="FFFFFF"/>
+      </a:lt1>
+      <a:dk2>
+        <a:srgbClr val="0E2841"/>
+      </a:dk2>
+      <a:lt2>
+        <a:srgbClr val="E8E8E8"/>
+      </a:lt2>
+      <a:accent1>
+        <a:srgbClr val="156082"/>
+      </a:accent1>
+      <a:accent2>
+        <a:srgbClr val="E97132"/>
+      </a:accent2>
+      <a:accent3>
+        <a:srgbClr val="196B24"/>
+      </a:accent3>
+      <a:accent4>
+        <a:srgbClr val="0F9ED5"/>
+      </a:accent4>
+      <a:accent5>
+        <a:srgbClr val="A02B93"/>
+      </a:accent5>
+      <a:accent6>
+        <a:srgbClr val="4EA72E"/>
+      </a:accent6>
+      <a:hlink>
+        <a:srgbClr val="467886"/>
+      </a:hlink>
+      <a:folHlink>
+        <a:srgbClr val="96607D"/>
+      </a:folHlink>
+    </a:clrScheme>
+    <a:fontScheme name="Office">
+      <a:majorFont>
+        <a:latin typeface="Aptos Display" panose="02110004020202020204"/>
+        <a:ea typeface=""/>
+        <a:cs typeface=""/>
+        <a:font script="Jpan" typeface="游ゴシック Light"/>
+        <a:font script="Hang" typeface="맑은 고딕"/>
+        <a:font script="Hans" typeface="等线 Light"/>
+        <a:font script="Hant" typeface="新細明體"/>
+        <a:font script="Arab" typeface="Times New Roman"/>
+        <a:font script="Hebr" typeface="Times New Roman"/>
+        <a:font script="Thai" typeface="Angsana New"/>
+        <a:font script="Ethi" typeface="Nyala"/>
+        <a:font script="Beng" typeface="Vrinda"/>
+        <a:font script="Gujr" typeface="Shruti"/>
+        <a:font script="Khmr" typeface="MoolBoran"/>
+        <a:font script="Knda" typeface="Tunga"/>
+        <a:font script="Guru" typeface="Raavi"/>
+        <a:font script="Cans" typeface="Euphemia"/>
+        <a:font script="Cher" typeface="Plantagenet Cherokee"/>
+        <a:font script="Yiii" typeface="Microsoft Yi Baiti"/>
+        <a:font script="Tibt" typeface="Microsoft Himalaya"/>
+        <a:font script="Thaa" typeface="MV Boli"/>
+        <a:font script="Deva" typeface="Mangal"/>
+        <a:font script="Telu" typeface="Gautami"/>
+        <a:font script="Taml" typeface="Latha"/>
+        <a:font script="Syrc" typeface="Estrangelo Edessa"/>
+        <a:font script="Orya" typeface="Kalinga"/>
+        <a:font script="Mlym" typeface="Kartika"/>
+        <a:font script="Laoo" typeface="DokChampa"/>
+        <a:font script="Sinh" typeface="Iskoola Pota"/>
+        <a:font script="Mong" typeface="Mongolian Baiti"/>
+        <a:font script="Viet" typeface="Times New Roman"/>
+        <a:font script="Uigh" typeface="Microsoft Uighur"/>
+        <a:font script="Geor" typeface="Sylfaen"/>
+        <a:font script="Armn" typeface="Arial"/>
+        <a:font script="Bugi" typeface="Leelawadee UI"/>
+        <a:font script="Bopo" typeface="Microsoft JhengHei"/>
+        <a:font script="Java" typeface="Javanese Text"/>
+        <a:font script="Lisu" typeface="Segoe UI"/>
+        <a:font script="Mymr" typeface="Myanmar Text"/>
+        <a:font script="Nkoo" typeface="Ebrima"/>
+        <a:font script="Olck" typeface="Nirmala UI"/>
+        <a:font script="Osma" typeface="Ebrima"/>
+        <a:font script="Phag" typeface="Phagspa"/>
+        <a:font script="Syrn" typeface="Estrangelo Edessa"/>
+        <a:font script="Syrj" typeface="Estrangelo Edessa"/>
+        <a:font script="Syre" typeface="Estrangelo Edessa"/>
+        <a:font script="Sora" typeface="Nirmala UI"/>
+        <a:font script="Tale" typeface="Microsoft Tai Le"/>
+        <a:font script="Talu" typeface="Microsoft New Tai Lue"/>
+        <a:font script="Tfng" typeface="Ebrima"/>
+      </a:majorFont>
+      <a:minorFont>
+        <a:latin typeface="Aptos" panose="02110004020202020204"/>
+        <a:ea typeface=""/>
+        <a:cs typeface=""/>
+        <a:font script="Jpan" typeface="游ゴシック"/>
+        <a:font script="Hang" typeface="맑은 고딕"/>
+        <a:font script="Hans" typeface="等线"/>
+        <a:font script="Hant" typeface="新細明體"/>
+        <a:font script="Arab" typeface="Arial"/>
+        <a:font script="Hebr" typeface="Arial"/>
+        <a:font script="Thai" typeface="Cordia New"/>
+        <a:font script="Ethi" typeface="Nyala"/>
+        <a:font script="Beng" typeface="Vrinda"/>
+        <a:font script="Gujr" typeface="Shruti"/>
+        <a:font script="Khmr" typeface="DaunPenh"/>
+        <a:font script="Knda" typeface="Tunga"/>
+        <a:font script="Guru" typeface="Raavi"/>
+        <a:font script="Cans" typeface="Euphemia"/>
+        <a:font script="Cher" typeface="Plantagenet Cherokee"/>
+        <a:font script="Yiii" typeface="Microsoft Yi Baiti"/>
+        <a:font script="Tibt" typeface="Microsoft Himalaya"/>
+        <a:font script="Thaa" typeface="MV Boli"/>
+        <a:font script="Deva" typeface="Mangal"/>
+        <a:font script="Telu" typeface="Gautami"/>
+        <a:font script="Taml" typeface="Latha"/>
+        <a:font script="Syrc" typeface="Estrangelo Edessa"/>
+        <a:font script="Orya" typeface="Kalinga"/>
+        <a:font script="Mlym" typeface="Kartika"/>
+        <a:font script="Laoo" typeface="DokChampa"/>
+        <a:font script="Sinh" typeface="Iskoola Pota"/>
+        <a:font script="Mong" typeface="Mongolian Baiti"/>
+        <a:font script="Viet" typeface="Arial"/>
+        <a:font script="Uigh" typeface="Microsoft Uighur"/>
+        <a:font script="Geor" typeface="Sylfaen"/>
+        <a:font script="Armn" typeface="Arial"/>
+        <a:font script="Bugi" typeface="Leelawadee UI"/>
+        <a:font script="Bopo" typeface="Microsoft JhengHei"/>
+        <a:font script="Java" typeface="Javanese Text"/>
+        <a:font script="Lisu" typeface="Segoe UI"/>
+        <a:font script="Mymr" typeface="Myanmar Text"/>
+        <a:font script="Nkoo" typeface="Ebrima"/>
+        <a:font script="Olck" typeface="Nirmala UI"/>
+        <a:font script="Osma" typeface="Ebrima"/>
+        <a:font script="Phag" typeface="Phagspa"/>
+        <a:font script="Syrn" typeface="Estrangelo Edessa"/>
+        <a:font script="Syrj" typeface="Estrangelo Edessa"/>
+        <a:font script="Syre" typeface="Estrangelo Edessa"/>
+        <a:font script="Sora" typeface="Nirmala UI"/>
+        <a:font script="Tale" typeface="Microsoft Tai Le"/>
+        <a:font script="Talu" typeface="Microsoft New Tai Lue"/>
+        <a:font script="Tfng" typeface="Ebrima"/>
+      </a:minorFont>
+    </a:fontScheme>
+    <a:fmtScheme name="Office">
+      <a:fillStyleLst>
+        <a:solidFill>
+          <a:schemeClr val="phClr"/>
+        </a:solidFill>
+        <a:gradFill rotWithShape="1">
+          <a:gsLst>
+            <a:gs pos="0">
+              <a:schemeClr val="phClr">
+                <a:lumMod val="110000"/>
+                <a:satMod val="105000"/>
+                <a:tint val="67000"/>
+              </a:schemeClr>
+            </a:gs>
+            <a:gs pos="50000">
+              <a:schemeClr val="phClr">
+                <a:lumMod val="105000"/>
+                <a:satMod val="103000"/>
+                <a:tint val="73000"/>
+              </a:schemeClr>
+            </a:gs>
+            <a:gs pos="100000">
+              <a:schemeClr val="phClr">
+                <a:lumMod val="105000"/>
+                <a:satMod val="109000"/>
+                <a:tint val="81000"/>
+              </a:schemeClr>
+            </a:gs>
+          </a:gsLst>
+          <a:lin ang="5400000" scaled="0"/>
+        </a:gradFill>
+        <a:gradFill rotWithShape="1">
+          <a:gsLst>
+            <a:gs pos="0">
+              <a:schemeClr val="phClr">
+                <a:satMod val="103000"/>
+                <a:lumMod val="102000"/>
+                <a:tint val="94000"/>
+              </a:schemeClr>
+            </a:gs>
+            <a:gs pos="50000">
+              <a:schemeClr val="phClr">
+                <a:satMod val="110000"/>
+                <a:lumMod val="100000"/>
+                <a:shade val="100000"/>
+              </a:schemeClr>
+            </a:gs>
+            <a:gs pos="100000">
+              <a:schemeClr val="phClr">
+                <a:lumMod val="99000"/>
+                <a:satMod val="120000"/>
+                <a:shade val="78000"/>
+              </a:schemeClr>
+            </a:gs>
+          </a:gsLst>
+          <a:lin ang="5400000" scaled="0"/>
+        </a:gradFill>
+      </a:fillStyleLst>
+      <a:lnStyleLst>
+        <a:ln w="12700" cap="flat" cmpd="sng" algn="ctr">
+          <a:solidFill>
+            <a:schemeClr val="phClr"/>
+          </a:solidFill>
+          <a:prstDash val="solid"/>
+          <a:miter lim="800000"/>
+        </a:ln>
+        <a:ln w="19050" cap="flat" cmpd="sng" algn="ctr">
+          <a:solidFill>
+            <a:schemeClr val="phClr"/>
+          </a:solidFill>
+          <a:prstDash val="solid"/>
+          <a:miter lim="800000"/>
+        </a:ln>
+        <a:ln w="25400" cap="flat" cmpd="sng" algn="ctr">
+          <a:solidFill>
+            <a:schemeClr val="phClr"/>
+          </a:solidFill>
+          <a:prstDash val="solid"/>
+          <a:miter lim="800000"/>
+        </a:ln>
+      </a:lnStyleLst>
+      <a:effectStyleLst>
+        <a:effectStyle>
+          <a:effectLst/>
+        </a:effectStyle>
+        <a:effectStyle>
+          <a:effectLst/>
+        </a:effectStyle>
+        <a:effectStyle>
+          <a:effectLst>
+            <a:outerShdw blurRad="57150" dist="19050" dir="5400000" algn="ctr" rotWithShape="0">
+              <a:srgbClr val="000000">
+                <a:alpha val="63000"/>
+              </a:srgbClr>
+            </a:outerShdw>
+          </a:effectLst>
+        </a:effectStyle>
+      </a:effectStyleLst>
+      <a:bgFillStyleLst>
+        <a:solidFill>
+          <a:schemeClr val="phClr"/>
+        </a:solidFill>
+        <a:solidFill>
+          <a:schemeClr val="phClr">
+            <a:tint val="95000"/>
+            <a:satMod val="170000"/>
+          </a:schemeClr>
+        </a:solidFill>
+        <a:gradFill rotWithShape="1">
+          <a:gsLst>
+            <a:gs pos="0">
+              <a:schemeClr val="phClr">
+                <a:tint val="93000"/>
+                <a:satMod val="150000"/>
+                <a:shade val="98000"/>
+                <a:lumMod val="102000"/>
+              </a:schemeClr>
+            </a:gs>
+            <a:gs pos="50000">
+              <a:schemeClr val="phClr">
+                <a:tint val="98000"/>
+                <a:satMod val="130000"/>
+                <a:shade val="90000"/>
+                <a:lumMod val="103000"/>
+              </a:schemeClr>
+            </a:gs>
+            <a:gs pos="100000">
+              <a:schemeClr val="phClr">
+                <a:shade val="63000"/>
+                <a:satMod val="120000"/>
+              </a:schemeClr>
+            </a:gs>
+          </a:gsLst>
+          <a:lin ang="5400000" scaled="0"/>
+        </a:gradFill>
+      </a:bgFillStyleLst>
+    </a:fmtScheme>
+  </a:themeElements>
+  <a:objectDefaults>
+    <a:lnDef>
+      <a:spPr/>
+      <a:bodyPr/>
+      <a:lstStyle/>
+      <a:style>
+        <a:lnRef idx="2">
+          <a:schemeClr val="accent1"/>
+        </a:lnRef>
+        <a:fillRef idx="0">
+          <a:schemeClr val="accent1"/>
+        </a:fillRef>
+        <a:effectRef idx="1">
+          <a:schemeClr val="accent1"/>
+        </a:effectRef>
+        <a:fontRef idx="minor">
+          <a:schemeClr val="tx1"/>
+        </a:fontRef>
+      </a:style>
+    </a:lnDef>
+  </a:objectDefaults>
+  <a:extraClrSchemeLst/>
+  <a:extLst>
+    <a:ext uri="{05A4C25C-085E-4340-85A3-A5531E510DB2}">
+      <thm15:themeFamily xmlns:thm15="http://schemas.microsoft.com/office/thememl/2012/main" name="Office Theme" id="{2E142A2C-CD16-42D6-873A-C26D2A0506FA}" vid="{1BDDFF52-6CD6-40A5-AB3C-68EB2F1E4D0A}"/>
+    </a:ext>
+  </a:extLst>
+</a:theme>
 </file>
</xml_diff>

<commit_message>
all done, still no satisfying results, but well...
</commit_message>
<xml_diff>
--- a/DSSS_HW_JImhoff.pptx
+++ b/DSSS_HW_JImhoff.pptx
@@ -8,12 +8,12 @@
     <p:notesMasterId r:id="rId8"/>
   </p:notesMasterIdLst>
   <p:sldIdLst>
-    <p:sldId id="256" r:id="rId2"/>
-    <p:sldId id="258" r:id="rId3"/>
-    <p:sldId id="257" r:id="rId4"/>
-    <p:sldId id="259" r:id="rId5"/>
-    <p:sldId id="260" r:id="rId6"/>
-    <p:sldId id="261" r:id="rId7"/>
+    <p:sldId id="258" r:id="rId2"/>
+    <p:sldId id="257" r:id="rId3"/>
+    <p:sldId id="259" r:id="rId4"/>
+    <p:sldId id="260" r:id="rId5"/>
+    <p:sldId id="261" r:id="rId6"/>
+    <p:sldId id="256" r:id="rId7"/>
   </p:sldIdLst>
   <p:sldSz cx="9906000" cy="6858000" type="A4"/>
   <p:notesSz cx="6858000" cy="9875838"/>
@@ -213,7 +213,7 @@
           <a:p>
             <a:fld id="{3F5040D0-9E54-4261-8C26-994613EA8D38}" type="datetimeFigureOut">
               <a:rPr lang="en-GB" smtClean="0"/>
-              <a:t>26/01/2025</a:t>
+              <a:t>09/02/2025</a:t>
             </a:fld>
             <a:endParaRPr lang="en-GB"/>
           </a:p>
@@ -612,7 +612,7 @@
           <a:p>
             <a:fld id="{1DC94265-D558-479C-B273-1E0799ACBC99}" type="datetimeFigureOut">
               <a:rPr lang="en-GB" smtClean="0"/>
-              <a:t>26/01/2025</a:t>
+              <a:t>09/02/2025</a:t>
             </a:fld>
             <a:endParaRPr lang="en-GB"/>
           </a:p>
@@ -782,7 +782,7 @@
           <a:p>
             <a:fld id="{1DC94265-D558-479C-B273-1E0799ACBC99}" type="datetimeFigureOut">
               <a:rPr lang="en-GB" smtClean="0"/>
-              <a:t>26/01/2025</a:t>
+              <a:t>09/02/2025</a:t>
             </a:fld>
             <a:endParaRPr lang="en-GB"/>
           </a:p>
@@ -962,7 +962,7 @@
           <a:p>
             <a:fld id="{1DC94265-D558-479C-B273-1E0799ACBC99}" type="datetimeFigureOut">
               <a:rPr lang="en-GB" smtClean="0"/>
-              <a:t>26/01/2025</a:t>
+              <a:t>09/02/2025</a:t>
             </a:fld>
             <a:endParaRPr lang="en-GB"/>
           </a:p>
@@ -1132,7 +1132,7 @@
           <a:p>
             <a:fld id="{1DC94265-D558-479C-B273-1E0799ACBC99}" type="datetimeFigureOut">
               <a:rPr lang="en-GB" smtClean="0"/>
-              <a:t>26/01/2025</a:t>
+              <a:t>09/02/2025</a:t>
             </a:fld>
             <a:endParaRPr lang="en-GB"/>
           </a:p>
@@ -1378,7 +1378,7 @@
           <a:p>
             <a:fld id="{1DC94265-D558-479C-B273-1E0799ACBC99}" type="datetimeFigureOut">
               <a:rPr lang="en-GB" smtClean="0"/>
-              <a:t>26/01/2025</a:t>
+              <a:t>09/02/2025</a:t>
             </a:fld>
             <a:endParaRPr lang="en-GB"/>
           </a:p>
@@ -1610,7 +1610,7 @@
           <a:p>
             <a:fld id="{1DC94265-D558-479C-B273-1E0799ACBC99}" type="datetimeFigureOut">
               <a:rPr lang="en-GB" smtClean="0"/>
-              <a:t>26/01/2025</a:t>
+              <a:t>09/02/2025</a:t>
             </a:fld>
             <a:endParaRPr lang="en-GB"/>
           </a:p>
@@ -1977,7 +1977,7 @@
           <a:p>
             <a:fld id="{1DC94265-D558-479C-B273-1E0799ACBC99}" type="datetimeFigureOut">
               <a:rPr lang="en-GB" smtClean="0"/>
-              <a:t>26/01/2025</a:t>
+              <a:t>09/02/2025</a:t>
             </a:fld>
             <a:endParaRPr lang="en-GB"/>
           </a:p>
@@ -2095,7 +2095,7 @@
           <a:p>
             <a:fld id="{1DC94265-D558-479C-B273-1E0799ACBC99}" type="datetimeFigureOut">
               <a:rPr lang="en-GB" smtClean="0"/>
-              <a:t>26/01/2025</a:t>
+              <a:t>09/02/2025</a:t>
             </a:fld>
             <a:endParaRPr lang="en-GB"/>
           </a:p>
@@ -2190,7 +2190,7 @@
           <a:p>
             <a:fld id="{1DC94265-D558-479C-B273-1E0799ACBC99}" type="datetimeFigureOut">
               <a:rPr lang="en-GB" smtClean="0"/>
-              <a:t>26/01/2025</a:t>
+              <a:t>09/02/2025</a:t>
             </a:fld>
             <a:endParaRPr lang="en-GB"/>
           </a:p>
@@ -2467,7 +2467,7 @@
           <a:p>
             <a:fld id="{1DC94265-D558-479C-B273-1E0799ACBC99}" type="datetimeFigureOut">
               <a:rPr lang="en-GB" smtClean="0"/>
-              <a:t>26/01/2025</a:t>
+              <a:t>09/02/2025</a:t>
             </a:fld>
             <a:endParaRPr lang="en-GB"/>
           </a:p>
@@ -2724,7 +2724,7 @@
           <a:p>
             <a:fld id="{1DC94265-D558-479C-B273-1E0799ACBC99}" type="datetimeFigureOut">
               <a:rPr lang="en-GB" smtClean="0"/>
-              <a:t>26/01/2025</a:t>
+              <a:t>09/02/2025</a:t>
             </a:fld>
             <a:endParaRPr lang="en-GB"/>
           </a:p>
@@ -2937,7 +2937,7 @@
           <a:p>
             <a:fld id="{1DC94265-D558-479C-B273-1E0799ACBC99}" type="datetimeFigureOut">
               <a:rPr lang="en-GB" smtClean="0"/>
-              <a:t>26/01/2025</a:t>
+              <a:t>09/02/2025</a:t>
             </a:fld>
             <a:endParaRPr lang="en-GB"/>
           </a:p>
@@ -3419,134 +3419,6 @@
         </p:nvSpPr>
         <p:spPr>
           <a:xfrm>
-            <a:off x="358666" y="322544"/>
-            <a:ext cx="4722428" cy="461665"/>
-          </a:xfrm>
-          <a:prstGeom prst="rect">
-            <a:avLst/>
-          </a:prstGeom>
-          <a:noFill/>
-        </p:spPr>
-        <p:txBody>
-          <a:bodyPr wrap="square" lIns="29250" rtlCol="0">
-            <a:spAutoFit/>
-          </a:bodyPr>
-          <a:lstStyle/>
-          <a:p>
-            <a:r>
-              <a:rPr lang="en-GB" sz="2400" b="1" dirty="0"/>
-              <a:t>Homework x</a:t>
-            </a:r>
-          </a:p>
-        </p:txBody>
-      </p:sp>
-    </p:spTree>
-    <p:extLst>
-      <p:ext uri="{BB962C8B-B14F-4D97-AF65-F5344CB8AC3E}">
-        <p14:creationId xmlns:p14="http://schemas.microsoft.com/office/powerpoint/2010/main" val="653632346"/>
-      </p:ext>
-    </p:extLst>
-  </p:cSld>
-  <p:clrMapOvr>
-    <a:masterClrMapping/>
-  </p:clrMapOvr>
-</p:sld>
-</file>
-
-<file path=ppt/slides/slide2.xml><?xml version="1.0" encoding="utf-8"?>
-<p:sld xmlns:a="http://schemas.openxmlformats.org/drawingml/2006/main" xmlns:r="http://schemas.openxmlformats.org/officeDocument/2006/relationships" xmlns:p="http://schemas.openxmlformats.org/presentationml/2006/main">
-  <p:cSld>
-    <p:spTree>
-      <p:nvGrpSpPr>
-        <p:cNvPr id="1" name=""/>
-        <p:cNvGrpSpPr/>
-        <p:nvPr/>
-      </p:nvGrpSpPr>
-      <p:grpSpPr>
-        <a:xfrm>
-          <a:off x="0" y="0"/>
-          <a:ext cx="0" cy="0"/>
-          <a:chOff x="0" y="0"/>
-          <a:chExt cx="0" cy="0"/>
-        </a:xfrm>
-      </p:grpSpPr>
-      <p:sp>
-        <p:nvSpPr>
-          <p:cNvPr id="4" name="Textfeld 3">
-            <a:extLst>
-              <a:ext uri="{FF2B5EF4-FFF2-40B4-BE49-F238E27FC236}">
-                <a16:creationId xmlns:a16="http://schemas.microsoft.com/office/drawing/2014/main" id="{C5844506-ECFB-8EAD-B28F-A560201A6017}"/>
-              </a:ext>
-            </a:extLst>
-          </p:cNvPr>
-          <p:cNvSpPr txBox="1"/>
-          <p:nvPr/>
-        </p:nvSpPr>
-        <p:spPr>
-          <a:xfrm>
-            <a:off x="358666" y="5889125"/>
-            <a:ext cx="2485039" cy="646331"/>
-          </a:xfrm>
-          <a:prstGeom prst="rect">
-            <a:avLst/>
-          </a:prstGeom>
-          <a:noFill/>
-        </p:spPr>
-        <p:txBody>
-          <a:bodyPr wrap="square" lIns="29250" rtlCol="0">
-            <a:spAutoFit/>
-          </a:bodyPr>
-          <a:lstStyle/>
-          <a:p>
-            <a:r>
-              <a:rPr lang="en-GB" sz="1200" b="1" dirty="0"/>
-              <a:t>Name</a:t>
-            </a:r>
-            <a:r>
-              <a:rPr lang="en-GB" sz="1200" dirty="0"/>
-              <a:t>: Josephina Imhoff</a:t>
-            </a:r>
-          </a:p>
-          <a:p>
-            <a:r>
-              <a:rPr lang="en-GB" sz="1200" b="1" dirty="0"/>
-              <a:t>Matriculation No.: </a:t>
-            </a:r>
-            <a:r>
-              <a:rPr lang="en-GB" sz="1200" dirty="0"/>
-              <a:t>23464631</a:t>
-            </a:r>
-          </a:p>
-          <a:p>
-            <a:r>
-              <a:rPr lang="en-GB" sz="1200" b="1" dirty="0" err="1"/>
-              <a:t>IdM</a:t>
-            </a:r>
-            <a:r>
-              <a:rPr lang="en-GB" sz="1200" b="1" dirty="0"/>
-              <a:t>:</a:t>
-            </a:r>
-            <a:r>
-              <a:rPr lang="en-GB" sz="1200" dirty="0"/>
-              <a:t> jo17wila</a:t>
-            </a:r>
-          </a:p>
-        </p:txBody>
-      </p:sp>
-      <p:sp>
-        <p:nvSpPr>
-          <p:cNvPr id="5" name="Textfeld 4">
-            <a:extLst>
-              <a:ext uri="{FF2B5EF4-FFF2-40B4-BE49-F238E27FC236}">
-                <a16:creationId xmlns:a16="http://schemas.microsoft.com/office/drawing/2014/main" id="{015D9F6B-3CA4-1853-807B-9CE45FA0C181}"/>
-              </a:ext>
-            </a:extLst>
-          </p:cNvPr>
-          <p:cNvSpPr txBox="1"/>
-          <p:nvPr/>
-        </p:nvSpPr>
-        <p:spPr>
-          <a:xfrm>
             <a:off x="358666" y="590926"/>
             <a:ext cx="4722428" cy="461665"/>
           </a:xfrm>
@@ -3830,7 +3702,7 @@
 </p:sld>
 </file>
 
-<file path=ppt/slides/slide3.xml><?xml version="1.0" encoding="utf-8"?>
+<file path=ppt/slides/slide2.xml><?xml version="1.0" encoding="utf-8"?>
 <p:sld xmlns:a="http://schemas.openxmlformats.org/drawingml/2006/main" xmlns:r="http://schemas.openxmlformats.org/officeDocument/2006/relationships" xmlns:p="http://schemas.openxmlformats.org/presentationml/2006/main">
   <p:cSld>
     <p:spTree>
@@ -4208,7 +4080,7 @@
 </p:sld>
 </file>
 
-<file path=ppt/slides/slide4.xml><?xml version="1.0" encoding="utf-8"?>
+<file path=ppt/slides/slide3.xml><?xml version="1.0" encoding="utf-8"?>
 <p:sld xmlns:a="http://schemas.openxmlformats.org/drawingml/2006/main" xmlns:r="http://schemas.openxmlformats.org/officeDocument/2006/relationships" xmlns:p="http://schemas.openxmlformats.org/presentationml/2006/main">
   <p:cSld>
     <p:spTree>
@@ -5276,7 +5148,7 @@
 </p:sld>
 </file>
 
-<file path=ppt/slides/slide5.xml><?xml version="1.0" encoding="utf-8"?>
+<file path=ppt/slides/slide4.xml><?xml version="1.0" encoding="utf-8"?>
 <p:sld xmlns:a="http://schemas.openxmlformats.org/drawingml/2006/main" xmlns:r="http://schemas.openxmlformats.org/officeDocument/2006/relationships" xmlns:p="http://schemas.openxmlformats.org/presentationml/2006/main">
   <p:cSld>
     <p:spTree>
@@ -6006,7 +5878,7 @@
 </p:sld>
 </file>
 
-<file path=ppt/slides/slide6.xml><?xml version="1.0" encoding="utf-8"?>
+<file path=ppt/slides/slide5.xml><?xml version="1.0" encoding="utf-8"?>
 <p:sld xmlns:a="http://schemas.openxmlformats.org/drawingml/2006/main" xmlns:r="http://schemas.openxmlformats.org/officeDocument/2006/relationships" xmlns:p="http://schemas.openxmlformats.org/presentationml/2006/main">
   <p:cSld>
     <p:spTree>
@@ -6322,6 +6194,657 @@
     <p:extLst>
       <p:ext uri="{BB962C8B-B14F-4D97-AF65-F5344CB8AC3E}">
         <p14:creationId xmlns:p14="http://schemas.microsoft.com/office/powerpoint/2010/main" val="3442482418"/>
+      </p:ext>
+    </p:extLst>
+  </p:cSld>
+  <p:clrMapOvr>
+    <a:masterClrMapping/>
+  </p:clrMapOvr>
+</p:sld>
+</file>
+
+<file path=ppt/slides/slide6.xml><?xml version="1.0" encoding="utf-8"?>
+<p:sld xmlns:a="http://schemas.openxmlformats.org/drawingml/2006/main" xmlns:r="http://schemas.openxmlformats.org/officeDocument/2006/relationships" xmlns:p="http://schemas.openxmlformats.org/presentationml/2006/main">
+  <p:cSld>
+    <p:spTree>
+      <p:nvGrpSpPr>
+        <p:cNvPr id="1" name=""/>
+        <p:cNvGrpSpPr/>
+        <p:nvPr/>
+      </p:nvGrpSpPr>
+      <p:grpSpPr>
+        <a:xfrm>
+          <a:off x="0" y="0"/>
+          <a:ext cx="0" cy="0"/>
+          <a:chOff x="0" y="0"/>
+          <a:chExt cx="0" cy="0"/>
+        </a:xfrm>
+      </p:grpSpPr>
+      <p:sp>
+        <p:nvSpPr>
+          <p:cNvPr id="4" name="Textfeld 3">
+            <a:extLst>
+              <a:ext uri="{FF2B5EF4-FFF2-40B4-BE49-F238E27FC236}">
+                <a16:creationId xmlns:a16="http://schemas.microsoft.com/office/drawing/2014/main" id="{C5844506-ECFB-8EAD-B28F-A560201A6017}"/>
+              </a:ext>
+            </a:extLst>
+          </p:cNvPr>
+          <p:cNvSpPr txBox="1"/>
+          <p:nvPr/>
+        </p:nvSpPr>
+        <p:spPr>
+          <a:xfrm>
+            <a:off x="3643415" y="5972381"/>
+            <a:ext cx="2485039" cy="646331"/>
+          </a:xfrm>
+          <a:prstGeom prst="rect">
+            <a:avLst/>
+          </a:prstGeom>
+          <a:noFill/>
+        </p:spPr>
+        <p:txBody>
+          <a:bodyPr wrap="square" lIns="29250" rtlCol="0">
+            <a:spAutoFit/>
+          </a:bodyPr>
+          <a:lstStyle/>
+          <a:p>
+            <a:r>
+              <a:rPr lang="en-GB" sz="1200" b="1" dirty="0"/>
+              <a:t>Name</a:t>
+            </a:r>
+            <a:r>
+              <a:rPr lang="en-GB" sz="1200" dirty="0"/>
+              <a:t>: Josephina Imhoff</a:t>
+            </a:r>
+          </a:p>
+          <a:p>
+            <a:r>
+              <a:rPr lang="en-GB" sz="1200" b="1" dirty="0"/>
+              <a:t>Matriculation No.: </a:t>
+            </a:r>
+            <a:r>
+              <a:rPr lang="en-GB" sz="1200" dirty="0"/>
+              <a:t>23464631</a:t>
+            </a:r>
+          </a:p>
+          <a:p>
+            <a:r>
+              <a:rPr lang="en-GB" sz="1200" b="1" dirty="0" err="1"/>
+              <a:t>IdM</a:t>
+            </a:r>
+            <a:r>
+              <a:rPr lang="en-GB" sz="1200" b="1" dirty="0"/>
+              <a:t>:</a:t>
+            </a:r>
+            <a:r>
+              <a:rPr lang="en-GB" sz="1200" dirty="0"/>
+              <a:t> jo17wila</a:t>
+            </a:r>
+          </a:p>
+        </p:txBody>
+      </p:sp>
+      <p:sp>
+        <p:nvSpPr>
+          <p:cNvPr id="5" name="Textfeld 4">
+            <a:extLst>
+              <a:ext uri="{FF2B5EF4-FFF2-40B4-BE49-F238E27FC236}">
+                <a16:creationId xmlns:a16="http://schemas.microsoft.com/office/drawing/2014/main" id="{015D9F6B-3CA4-1853-807B-9CE45FA0C181}"/>
+              </a:ext>
+            </a:extLst>
+          </p:cNvPr>
+          <p:cNvSpPr txBox="1"/>
+          <p:nvPr/>
+        </p:nvSpPr>
+        <p:spPr>
+          <a:xfrm>
+            <a:off x="7478868" y="243884"/>
+            <a:ext cx="2048861" cy="461665"/>
+          </a:xfrm>
+          <a:prstGeom prst="rect">
+            <a:avLst/>
+          </a:prstGeom>
+          <a:noFill/>
+        </p:spPr>
+        <p:txBody>
+          <a:bodyPr wrap="square" lIns="29250" rtlCol="0">
+            <a:spAutoFit/>
+          </a:bodyPr>
+          <a:lstStyle/>
+          <a:p>
+            <a:r>
+              <a:rPr lang="en-GB" sz="2400" b="1" dirty="0"/>
+              <a:t>Homework 11</a:t>
+            </a:r>
+          </a:p>
+        </p:txBody>
+      </p:sp>
+      <p:pic>
+        <p:nvPicPr>
+          <p:cNvPr id="7" name="Grafik 6" descr="Ein Bild, das Text, Screenshot, Software enthält.&#10;&#10;KI-generierte Inhalte können fehlerhaft sein.">
+            <a:extLst>
+              <a:ext uri="{FF2B5EF4-FFF2-40B4-BE49-F238E27FC236}">
+                <a16:creationId xmlns:a16="http://schemas.microsoft.com/office/drawing/2014/main" id="{AA8DCA9E-9A75-3FE8-104C-3349B0DF6261}"/>
+              </a:ext>
+            </a:extLst>
+          </p:cNvPr>
+          <p:cNvPicPr>
+            <a:picLocks noChangeAspect="1"/>
+          </p:cNvPicPr>
+          <p:nvPr/>
+        </p:nvPicPr>
+        <p:blipFill>
+          <a:blip r:embed="rId2">
+            <a:extLst>
+              <a:ext uri="{28A0092B-C50C-407E-A947-70E740481C1C}">
+                <a14:useLocalDpi xmlns:a14="http://schemas.microsoft.com/office/drawing/2010/main" val="0"/>
+              </a:ext>
+            </a:extLst>
+          </a:blip>
+          <a:stretch>
+            <a:fillRect/>
+          </a:stretch>
+        </p:blipFill>
+        <p:spPr>
+          <a:xfrm>
+            <a:off x="378271" y="67429"/>
+            <a:ext cx="2534346" cy="2889007"/>
+          </a:xfrm>
+          <a:prstGeom prst="rect">
+            <a:avLst/>
+          </a:prstGeom>
+        </p:spPr>
+      </p:pic>
+      <p:pic>
+        <p:nvPicPr>
+          <p:cNvPr id="9" name="Grafik 8" descr="Ein Bild, das Text, Screenshot enthält.&#10;&#10;KI-generierte Inhalte können fehlerhaft sein.">
+            <a:extLst>
+              <a:ext uri="{FF2B5EF4-FFF2-40B4-BE49-F238E27FC236}">
+                <a16:creationId xmlns:a16="http://schemas.microsoft.com/office/drawing/2014/main" id="{42731611-5B83-A07B-2850-EA4AB144C269}"/>
+              </a:ext>
+            </a:extLst>
+          </p:cNvPr>
+          <p:cNvPicPr>
+            <a:picLocks noChangeAspect="1"/>
+          </p:cNvPicPr>
+          <p:nvPr/>
+        </p:nvPicPr>
+        <p:blipFill>
+          <a:blip r:embed="rId3">
+            <a:extLst>
+              <a:ext uri="{28A0092B-C50C-407E-A947-70E740481C1C}">
+                <a14:useLocalDpi xmlns:a14="http://schemas.microsoft.com/office/drawing/2010/main" val="0"/>
+              </a:ext>
+            </a:extLst>
+          </a:blip>
+          <a:stretch>
+            <a:fillRect/>
+          </a:stretch>
+        </p:blipFill>
+        <p:spPr>
+          <a:xfrm>
+            <a:off x="378271" y="2966462"/>
+            <a:ext cx="3047864" cy="2933338"/>
+          </a:xfrm>
+          <a:prstGeom prst="rect">
+            <a:avLst/>
+          </a:prstGeom>
+        </p:spPr>
+      </p:pic>
+      <p:pic>
+        <p:nvPicPr>
+          <p:cNvPr id="11" name="Grafik 10" descr="Ein Bild, das Text, Screenshot, Software, Schrift enthält.&#10;&#10;KI-generierte Inhalte können fehlerhaft sein.">
+            <a:extLst>
+              <a:ext uri="{FF2B5EF4-FFF2-40B4-BE49-F238E27FC236}">
+                <a16:creationId xmlns:a16="http://schemas.microsoft.com/office/drawing/2014/main" id="{4AAB4762-4612-3031-E8DB-AC664FD2D614}"/>
+              </a:ext>
+            </a:extLst>
+          </p:cNvPr>
+          <p:cNvPicPr>
+            <a:picLocks noChangeAspect="1"/>
+          </p:cNvPicPr>
+          <p:nvPr/>
+        </p:nvPicPr>
+        <p:blipFill>
+          <a:blip r:embed="rId4">
+            <a:extLst>
+              <a:ext uri="{28A0092B-C50C-407E-A947-70E740481C1C}">
+                <a14:useLocalDpi xmlns:a14="http://schemas.microsoft.com/office/drawing/2010/main" val="0"/>
+              </a:ext>
+            </a:extLst>
+          </a:blip>
+          <a:srcRect t="3166"/>
+          <a:stretch/>
+        </p:blipFill>
+        <p:spPr>
+          <a:xfrm>
+            <a:off x="378270" y="5912607"/>
+            <a:ext cx="1765915" cy="872886"/>
+          </a:xfrm>
+          <a:prstGeom prst="rect">
+            <a:avLst/>
+          </a:prstGeom>
+        </p:spPr>
+      </p:pic>
+      <p:sp>
+        <p:nvSpPr>
+          <p:cNvPr id="14" name="Textfeld 13">
+            <a:extLst>
+              <a:ext uri="{FF2B5EF4-FFF2-40B4-BE49-F238E27FC236}">
+                <a16:creationId xmlns:a16="http://schemas.microsoft.com/office/drawing/2014/main" id="{EBDAE2FC-44E9-9843-BA66-2697F2880212}"/>
+              </a:ext>
+            </a:extLst>
+          </p:cNvPr>
+          <p:cNvSpPr txBox="1"/>
+          <p:nvPr/>
+        </p:nvSpPr>
+        <p:spPr>
+          <a:xfrm>
+            <a:off x="2335215" y="54622"/>
+            <a:ext cx="577402" cy="369332"/>
+          </a:xfrm>
+          <a:prstGeom prst="rect">
+            <a:avLst/>
+          </a:prstGeom>
+          <a:noFill/>
+        </p:spPr>
+        <p:txBody>
+          <a:bodyPr wrap="none" rtlCol="0">
+            <a:spAutoFit/>
+          </a:bodyPr>
+          <a:lstStyle/>
+          <a:p>
+            <a:r>
+              <a:rPr lang="en-GB" b="1" dirty="0">
+                <a:solidFill>
+                  <a:schemeClr val="bg1"/>
+                </a:solidFill>
+              </a:rPr>
+              <a:t>GUI</a:t>
+            </a:r>
+            <a:endParaRPr lang="en-GB" dirty="0">
+              <a:solidFill>
+                <a:schemeClr val="bg1"/>
+              </a:solidFill>
+            </a:endParaRPr>
+          </a:p>
+        </p:txBody>
+      </p:sp>
+      <p:grpSp>
+        <p:nvGrpSpPr>
+          <p:cNvPr id="32" name="Gruppieren 31">
+            <a:extLst>
+              <a:ext uri="{FF2B5EF4-FFF2-40B4-BE49-F238E27FC236}">
+                <a16:creationId xmlns:a16="http://schemas.microsoft.com/office/drawing/2014/main" id="{CAD24CE4-0C58-2253-A394-71B78D80F388}"/>
+              </a:ext>
+            </a:extLst>
+          </p:cNvPr>
+          <p:cNvGrpSpPr/>
+          <p:nvPr/>
+        </p:nvGrpSpPr>
+        <p:grpSpPr>
+          <a:xfrm>
+            <a:off x="3639351" y="239288"/>
+            <a:ext cx="2402722" cy="3984031"/>
+            <a:chOff x="7125007" y="367866"/>
+            <a:chExt cx="2402722" cy="3984031"/>
+          </a:xfrm>
+        </p:grpSpPr>
+        <p:pic>
+          <p:nvPicPr>
+            <p:cNvPr id="16" name="Grafik 15">
+              <a:extLst>
+                <a:ext uri="{FF2B5EF4-FFF2-40B4-BE49-F238E27FC236}">
+                  <a16:creationId xmlns:a16="http://schemas.microsoft.com/office/drawing/2014/main" id="{E8E8053A-F218-0E59-CCE6-9EFD01197F9C}"/>
+                </a:ext>
+              </a:extLst>
+            </p:cNvPr>
+            <p:cNvPicPr>
+              <a:picLocks noChangeAspect="1"/>
+            </p:cNvPicPr>
+            <p:nvPr/>
+          </p:nvPicPr>
+          <p:blipFill>
+            <a:blip r:embed="rId5">
+              <a:extLst>
+                <a:ext uri="{28A0092B-C50C-407E-A947-70E740481C1C}">
+                  <a14:useLocalDpi xmlns:a14="http://schemas.microsoft.com/office/drawing/2010/main" val="0"/>
+                </a:ext>
+              </a:extLst>
+            </a:blip>
+            <a:stretch>
+              <a:fillRect/>
+            </a:stretch>
+          </p:blipFill>
+          <p:spPr>
+            <a:xfrm>
+              <a:off x="7125007" y="367866"/>
+              <a:ext cx="1181794" cy="1972096"/>
+            </a:xfrm>
+            <a:prstGeom prst="rect">
+              <a:avLst/>
+            </a:prstGeom>
+          </p:spPr>
+        </p:pic>
+        <p:pic>
+          <p:nvPicPr>
+            <p:cNvPr id="18" name="Grafik 17">
+              <a:extLst>
+                <a:ext uri="{FF2B5EF4-FFF2-40B4-BE49-F238E27FC236}">
+                  <a16:creationId xmlns:a16="http://schemas.microsoft.com/office/drawing/2014/main" id="{B8877ACB-38D3-BCAB-27CE-F868A8577C42}"/>
+                </a:ext>
+              </a:extLst>
+            </p:cNvPr>
+            <p:cNvPicPr>
+              <a:picLocks noChangeAspect="1"/>
+            </p:cNvPicPr>
+            <p:nvPr/>
+          </p:nvPicPr>
+          <p:blipFill>
+            <a:blip r:embed="rId6">
+              <a:extLst>
+                <a:ext uri="{28A0092B-C50C-407E-A947-70E740481C1C}">
+                  <a14:useLocalDpi xmlns:a14="http://schemas.microsoft.com/office/drawing/2010/main" val="0"/>
+                </a:ext>
+              </a:extLst>
+            </a:blip>
+            <a:stretch>
+              <a:fillRect/>
+            </a:stretch>
+          </p:blipFill>
+          <p:spPr>
+            <a:xfrm>
+              <a:off x="7125007" y="2379801"/>
+              <a:ext cx="1181794" cy="1972096"/>
+            </a:xfrm>
+            <a:prstGeom prst="rect">
+              <a:avLst/>
+            </a:prstGeom>
+          </p:spPr>
+        </p:pic>
+        <p:pic>
+          <p:nvPicPr>
+            <p:cNvPr id="20" name="Grafik 19">
+              <a:extLst>
+                <a:ext uri="{FF2B5EF4-FFF2-40B4-BE49-F238E27FC236}">
+                  <a16:creationId xmlns:a16="http://schemas.microsoft.com/office/drawing/2014/main" id="{3AC36778-6F7E-00B0-C347-F070A908A695}"/>
+                </a:ext>
+              </a:extLst>
+            </p:cNvPr>
+            <p:cNvPicPr>
+              <a:picLocks noChangeAspect="1"/>
+            </p:cNvPicPr>
+            <p:nvPr/>
+          </p:nvPicPr>
+          <p:blipFill>
+            <a:blip r:embed="rId7">
+              <a:extLst>
+                <a:ext uri="{28A0092B-C50C-407E-A947-70E740481C1C}">
+                  <a14:useLocalDpi xmlns:a14="http://schemas.microsoft.com/office/drawing/2010/main" val="0"/>
+                </a:ext>
+              </a:extLst>
+            </a:blip>
+            <a:stretch>
+              <a:fillRect/>
+            </a:stretch>
+          </p:blipFill>
+          <p:spPr>
+            <a:xfrm>
+              <a:off x="8345935" y="367866"/>
+              <a:ext cx="1181794" cy="1972096"/>
+            </a:xfrm>
+            <a:prstGeom prst="rect">
+              <a:avLst/>
+            </a:prstGeom>
+          </p:spPr>
+        </p:pic>
+        <p:pic>
+          <p:nvPicPr>
+            <p:cNvPr id="22" name="Grafik 21">
+              <a:extLst>
+                <a:ext uri="{FF2B5EF4-FFF2-40B4-BE49-F238E27FC236}">
+                  <a16:creationId xmlns:a16="http://schemas.microsoft.com/office/drawing/2014/main" id="{77BB1E43-BA36-4B2B-9A6C-DC0A3B4BF932}"/>
+                </a:ext>
+              </a:extLst>
+            </p:cNvPr>
+            <p:cNvPicPr>
+              <a:picLocks noChangeAspect="1"/>
+            </p:cNvPicPr>
+            <p:nvPr/>
+          </p:nvPicPr>
+          <p:blipFill>
+            <a:blip r:embed="rId8">
+              <a:extLst>
+                <a:ext uri="{28A0092B-C50C-407E-A947-70E740481C1C}">
+                  <a14:useLocalDpi xmlns:a14="http://schemas.microsoft.com/office/drawing/2010/main" val="0"/>
+                </a:ext>
+              </a:extLst>
+            </a:blip>
+            <a:stretch>
+              <a:fillRect/>
+            </a:stretch>
+          </p:blipFill>
+          <p:spPr>
+            <a:xfrm>
+              <a:off x="8345935" y="2379800"/>
+              <a:ext cx="1181794" cy="1972096"/>
+            </a:xfrm>
+            <a:prstGeom prst="rect">
+              <a:avLst/>
+            </a:prstGeom>
+          </p:spPr>
+        </p:pic>
+      </p:grpSp>
+      <p:grpSp>
+        <p:nvGrpSpPr>
+          <p:cNvPr id="30" name="Gruppieren 29">
+            <a:extLst>
+              <a:ext uri="{FF2B5EF4-FFF2-40B4-BE49-F238E27FC236}">
+                <a16:creationId xmlns:a16="http://schemas.microsoft.com/office/drawing/2014/main" id="{35C8A438-4214-8D3D-8898-90F1FA2A444C}"/>
+              </a:ext>
+            </a:extLst>
+          </p:cNvPr>
+          <p:cNvGrpSpPr/>
+          <p:nvPr/>
+        </p:nvGrpSpPr>
+        <p:grpSpPr>
+          <a:xfrm>
+            <a:off x="7123837" y="1794884"/>
+            <a:ext cx="2403892" cy="2343156"/>
+            <a:chOff x="3282910" y="54622"/>
+            <a:chExt cx="2403892" cy="2343156"/>
+          </a:xfrm>
+        </p:grpSpPr>
+        <p:pic>
+          <p:nvPicPr>
+            <p:cNvPr id="24" name="Grafik 23" descr="Ein Bild, das Text, Screenshot, Software enthält.&#10;&#10;KI-generierte Inhalte können fehlerhaft sein.">
+              <a:extLst>
+                <a:ext uri="{FF2B5EF4-FFF2-40B4-BE49-F238E27FC236}">
+                  <a16:creationId xmlns:a16="http://schemas.microsoft.com/office/drawing/2014/main" id="{430AC054-725B-4AEB-AF58-FEE7BF9E04D1}"/>
+                </a:ext>
+              </a:extLst>
+            </p:cNvPr>
+            <p:cNvPicPr>
+              <a:picLocks noChangeAspect="1"/>
+            </p:cNvPicPr>
+            <p:nvPr/>
+          </p:nvPicPr>
+          <p:blipFill>
+            <a:blip r:embed="rId9">
+              <a:extLst>
+                <a:ext uri="{28A0092B-C50C-407E-A947-70E740481C1C}">
+                  <a14:useLocalDpi xmlns:a14="http://schemas.microsoft.com/office/drawing/2010/main" val="0"/>
+                </a:ext>
+              </a:extLst>
+            </a:blip>
+            <a:stretch>
+              <a:fillRect/>
+            </a:stretch>
+          </p:blipFill>
+          <p:spPr>
+            <a:xfrm>
+              <a:off x="3333060" y="423954"/>
+              <a:ext cx="2353742" cy="1973824"/>
+            </a:xfrm>
+            <a:prstGeom prst="rect">
+              <a:avLst/>
+            </a:prstGeom>
+          </p:spPr>
+        </p:pic>
+        <p:sp>
+          <p:nvSpPr>
+            <p:cNvPr id="26" name="Textfeld 25">
+              <a:extLst>
+                <a:ext uri="{FF2B5EF4-FFF2-40B4-BE49-F238E27FC236}">
+                  <a16:creationId xmlns:a16="http://schemas.microsoft.com/office/drawing/2014/main" id="{411EB901-86AD-33E1-79C3-43DC3F874929}"/>
+                </a:ext>
+              </a:extLst>
+            </p:cNvPr>
+            <p:cNvSpPr txBox="1"/>
+            <p:nvPr/>
+          </p:nvSpPr>
+          <p:spPr>
+            <a:xfrm>
+              <a:off x="3282910" y="54622"/>
+              <a:ext cx="2268415" cy="369332"/>
+            </a:xfrm>
+            <a:prstGeom prst="rect">
+              <a:avLst/>
+            </a:prstGeom>
+            <a:noFill/>
+          </p:spPr>
+          <p:txBody>
+            <a:bodyPr wrap="square">
+              <a:spAutoFit/>
+            </a:bodyPr>
+            <a:lstStyle/>
+            <a:p>
+              <a:r>
+                <a:rPr lang="en-GB" b="1" dirty="0"/>
+                <a:t>Model Architecture</a:t>
+              </a:r>
+            </a:p>
+          </p:txBody>
+        </p:sp>
+      </p:grpSp>
+      <p:grpSp>
+        <p:nvGrpSpPr>
+          <p:cNvPr id="31" name="Gruppieren 30">
+            <a:extLst>
+              <a:ext uri="{FF2B5EF4-FFF2-40B4-BE49-F238E27FC236}">
+                <a16:creationId xmlns:a16="http://schemas.microsoft.com/office/drawing/2014/main" id="{2B93F765-D57D-9F2E-B33A-752486C4502E}"/>
+              </a:ext>
+            </a:extLst>
+          </p:cNvPr>
+          <p:cNvGrpSpPr/>
+          <p:nvPr/>
+        </p:nvGrpSpPr>
+        <p:grpSpPr>
+          <a:xfrm>
+            <a:off x="5933155" y="4390054"/>
+            <a:ext cx="3594574" cy="2224614"/>
+            <a:chOff x="3711160" y="4381291"/>
+            <a:chExt cx="3594574" cy="2224614"/>
+          </a:xfrm>
+        </p:grpSpPr>
+        <p:pic>
+          <p:nvPicPr>
+            <p:cNvPr id="28" name="Grafik 27" descr="Ein Bild, das Text, Screenshot, Schrift, Zahl enthält.&#10;&#10;KI-generierte Inhalte können fehlerhaft sein.">
+              <a:extLst>
+                <a:ext uri="{FF2B5EF4-FFF2-40B4-BE49-F238E27FC236}">
+                  <a16:creationId xmlns:a16="http://schemas.microsoft.com/office/drawing/2014/main" id="{8A47207A-B062-096D-4E01-081381540D80}"/>
+                </a:ext>
+              </a:extLst>
+            </p:cNvPr>
+            <p:cNvPicPr>
+              <a:picLocks noChangeAspect="1"/>
+            </p:cNvPicPr>
+            <p:nvPr/>
+          </p:nvPicPr>
+          <p:blipFill>
+            <a:blip r:embed="rId10">
+              <a:extLst>
+                <a:ext uri="{28A0092B-C50C-407E-A947-70E740481C1C}">
+                  <a14:useLocalDpi xmlns:a14="http://schemas.microsoft.com/office/drawing/2010/main" val="0"/>
+                </a:ext>
+              </a:extLst>
+            </a:blip>
+            <a:stretch>
+              <a:fillRect/>
+            </a:stretch>
+          </p:blipFill>
+          <p:spPr>
+            <a:xfrm>
+              <a:off x="3711160" y="4769572"/>
+              <a:ext cx="3496791" cy="1836333"/>
+            </a:xfrm>
+            <a:prstGeom prst="rect">
+              <a:avLst/>
+            </a:prstGeom>
+          </p:spPr>
+        </p:pic>
+        <p:sp>
+          <p:nvSpPr>
+            <p:cNvPr id="29" name="Textfeld 28">
+              <a:extLst>
+                <a:ext uri="{FF2B5EF4-FFF2-40B4-BE49-F238E27FC236}">
+                  <a16:creationId xmlns:a16="http://schemas.microsoft.com/office/drawing/2014/main" id="{D8C80FAB-BFEC-5506-96DB-384FE26E62F2}"/>
+                </a:ext>
+              </a:extLst>
+            </p:cNvPr>
+            <p:cNvSpPr txBox="1"/>
+            <p:nvPr/>
+          </p:nvSpPr>
+          <p:spPr>
+            <a:xfrm>
+              <a:off x="3711160" y="4381291"/>
+              <a:ext cx="3594574" cy="369332"/>
+            </a:xfrm>
+            <a:prstGeom prst="rect">
+              <a:avLst/>
+            </a:prstGeom>
+            <a:noFill/>
+          </p:spPr>
+          <p:txBody>
+            <a:bodyPr wrap="none" rtlCol="0">
+              <a:spAutoFit/>
+            </a:bodyPr>
+            <a:lstStyle/>
+            <a:p>
+              <a:r>
+                <a:rPr lang="en-US" b="1" dirty="0">
+                  <a:latin typeface="ProximaNova-Regular"/>
+                </a:rPr>
+                <a:t>T</a:t>
+              </a:r>
+              <a:r>
+                <a:rPr lang="en-US" sz="1800" b="1" i="0" dirty="0">
+                  <a:effectLst/>
+                  <a:latin typeface="ProximaNova-Regular"/>
+                </a:rPr>
+                <a:t>raining/Validation </a:t>
+              </a:r>
+              <a:r>
+                <a:rPr lang="en-US" b="1" dirty="0">
+                  <a:latin typeface="ProximaNova-Regular"/>
+                </a:rPr>
+                <a:t>L</a:t>
+              </a:r>
+              <a:r>
+                <a:rPr lang="en-US" sz="1800" b="1" i="0" dirty="0">
+                  <a:effectLst/>
+                  <a:latin typeface="ProximaNova-Regular"/>
+                </a:rPr>
+                <a:t>oss &amp; Accuracy</a:t>
+              </a:r>
+              <a:endParaRPr lang="en-GB" b="1" dirty="0"/>
+            </a:p>
+          </p:txBody>
+        </p:sp>
+      </p:grpSp>
+    </p:spTree>
+    <p:extLst>
+      <p:ext uri="{BB962C8B-B14F-4D97-AF65-F5344CB8AC3E}">
+        <p14:creationId xmlns:p14="http://schemas.microsoft.com/office/powerpoint/2010/main" val="653632346"/>
       </p:ext>
     </p:extLst>
   </p:cSld>

</xml_diff>